<commit_message>
MOD | DeckADD.js| Add submit function to create new decks
</commit_message>
<xml_diff>
--- a/design_architecture.pptx
+++ b/design_architecture.pptx
@@ -6,10 +6,10 @@
     <p:sldMasterId id="2147483660" r:id="rId2"/>
   </p:sldMasterIdLst>
   <p:notesMasterIdLst>
-    <p:notesMasterId r:id="rId19"/>
+    <p:notesMasterId r:id="rId20"/>
   </p:notesMasterIdLst>
   <p:handoutMasterIdLst>
-    <p:handoutMasterId r:id="rId20"/>
+    <p:handoutMasterId r:id="rId21"/>
   </p:handoutMasterIdLst>
   <p:sldIdLst>
     <p:sldId id="256" r:id="rId3"/>
@@ -19,15 +19,16 @@
     <p:sldId id="259" r:id="rId7"/>
     <p:sldId id="291" r:id="rId8"/>
     <p:sldId id="292" r:id="rId9"/>
-    <p:sldId id="280" r:id="rId10"/>
-    <p:sldId id="289" r:id="rId11"/>
-    <p:sldId id="283" r:id="rId12"/>
-    <p:sldId id="288" r:id="rId13"/>
-    <p:sldId id="284" r:id="rId14"/>
-    <p:sldId id="285" r:id="rId15"/>
-    <p:sldId id="286" r:id="rId16"/>
-    <p:sldId id="282" r:id="rId17"/>
-    <p:sldId id="281" r:id="rId18"/>
+    <p:sldId id="293" r:id="rId10"/>
+    <p:sldId id="280" r:id="rId11"/>
+    <p:sldId id="289" r:id="rId12"/>
+    <p:sldId id="283" r:id="rId13"/>
+    <p:sldId id="288" r:id="rId14"/>
+    <p:sldId id="284" r:id="rId15"/>
+    <p:sldId id="285" r:id="rId16"/>
+    <p:sldId id="286" r:id="rId17"/>
+    <p:sldId id="282" r:id="rId18"/>
+    <p:sldId id="281" r:id="rId19"/>
   </p:sldIdLst>
   <p:sldSz cx="10080625" cy="7559675"/>
   <p:notesSz cx="7559675" cy="10691813"/>
@@ -970,7 +971,7 @@
           <a:p>
             <a:pPr lvl="0"/>
             <a:fld id="{75DCCE53-8CBF-4F0D-9F69-4C4D61681C9D}" type="slidenum">
-              <a:t>14</a:t>
+              <a:t>15</a:t>
             </a:fld>
             <a:endParaRPr lang="en-US"/>
           </a:p>
@@ -1090,7 +1091,7 @@
           <a:p>
             <a:pPr lvl="0"/>
             <a:fld id="{75DCCE53-8CBF-4F0D-9F69-4C4D61681C9D}" type="slidenum">
-              <a:t>16</a:t>
+              <a:t>17</a:t>
             </a:fld>
             <a:endParaRPr lang="en-US"/>
           </a:p>
@@ -1449,7 +1450,7 @@
           <a:p>
             <a:pPr lvl="0"/>
             <a:fld id="{75DCCE53-8CBF-4F0D-9F69-4C4D61681C9D}" type="slidenum">
-              <a:t>8</a:t>
+              <a:t>9</a:t>
             </a:fld>
             <a:endParaRPr lang="en-US"/>
           </a:p>
@@ -1569,7 +1570,7 @@
           <a:p>
             <a:pPr lvl="0"/>
             <a:fld id="{75DCCE53-8CBF-4F0D-9F69-4C4D61681C9D}" type="slidenum">
-              <a:t>9</a:t>
+              <a:t>10</a:t>
             </a:fld>
             <a:endParaRPr lang="en-US"/>
           </a:p>
@@ -1689,7 +1690,7 @@
           <a:p>
             <a:pPr lvl="0"/>
             <a:fld id="{75DCCE53-8CBF-4F0D-9F69-4C4D61681C9D}" type="slidenum">
-              <a:t>10</a:t>
+              <a:t>11</a:t>
             </a:fld>
             <a:endParaRPr lang="en-US"/>
           </a:p>
@@ -1809,7 +1810,7 @@
           <a:p>
             <a:pPr lvl="0"/>
             <a:fld id="{75DCCE53-8CBF-4F0D-9F69-4C4D61681C9D}" type="slidenum">
-              <a:t>11</a:t>
+              <a:t>12</a:t>
             </a:fld>
             <a:endParaRPr lang="en-US"/>
           </a:p>
@@ -1929,7 +1930,7 @@
           <a:p>
             <a:pPr lvl="0"/>
             <a:fld id="{75DCCE53-8CBF-4F0D-9F69-4C4D61681C9D}" type="slidenum">
-              <a:t>12</a:t>
+              <a:t>13</a:t>
             </a:fld>
             <a:endParaRPr lang="en-US"/>
           </a:p>
@@ -2049,7 +2050,7 @@
           <a:p>
             <a:pPr lvl="0"/>
             <a:fld id="{75DCCE53-8CBF-4F0D-9F69-4C4D61681C9D}" type="slidenum">
-              <a:t>13</a:t>
+              <a:t>14</a:t>
             </a:fld>
             <a:endParaRPr lang="en-US"/>
           </a:p>
@@ -7868,6 +7869,782 @@
           <p:cNvGraphicFramePr>
             <a:graphicFrameLocks noGrp="1"/>
           </p:cNvGraphicFramePr>
+          <p:nvPr/>
+        </p:nvGraphicFramePr>
+        <p:xfrm>
+          <a:off x="423317" y="7133493"/>
+          <a:ext cx="4701228" cy="370840"/>
+        </p:xfrm>
+        <a:graphic>
+          <a:graphicData uri="http://schemas.openxmlformats.org/drawingml/2006/table">
+            <a:tbl>
+              <a:tblPr firstRow="1" bandRow="1">
+                <a:tableStyleId>{5C22544A-7EE6-4342-B048-85BDC9FD1C3A}</a:tableStyleId>
+              </a:tblPr>
+              <a:tblGrid>
+                <a:gridCol w="2350614">
+                  <a:extLst>
+                    <a:ext uri="{9D8B030D-6E8A-4147-A177-3AD203B41FA5}">
+                      <a16:colId xmlns:a16="http://schemas.microsoft.com/office/drawing/2014/main" val="3700248952"/>
+                    </a:ext>
+                  </a:extLst>
+                </a:gridCol>
+                <a:gridCol w="2350614">
+                  <a:extLst>
+                    <a:ext uri="{9D8B030D-6E8A-4147-A177-3AD203B41FA5}">
+                      <a16:colId xmlns:a16="http://schemas.microsoft.com/office/drawing/2014/main" val="253239616"/>
+                    </a:ext>
+                  </a:extLst>
+                </a:gridCol>
+              </a:tblGrid>
+              <a:tr h="370840">
+                <a:tc>
+                  <a:txBody>
+                    <a:bodyPr/>
+                    <a:lstStyle/>
+                    <a:p>
+                      <a:pPr algn="ctr"/>
+                      <a:r>
+                        <a:rPr lang="en-US" sz="1800" b="0" i="0" u="none" strike="noStrike" kern="1200" cap="none" dirty="0">
+                          <a:ln>
+                            <a:noFill/>
+                          </a:ln>
+                          <a:solidFill>
+                            <a:srgbClr val="FFFFFF"/>
+                          </a:solidFill>
+                          <a:latin typeface="Pothana2000" pitchFamily="18"/>
+                          <a:ea typeface="DejaVu Sans" pitchFamily="2"/>
+                          <a:cs typeface="DejaVu Sans" pitchFamily="2"/>
+                        </a:rPr>
+                        <a:t>Home</a:t>
+                      </a:r>
+                      <a:endParaRPr lang="en-AU" dirty="0"/>
+                    </a:p>
+                  </a:txBody>
+                  <a:tcPr>
+                    <a:lnL w="12700" cmpd="sng">
+                      <a:noFill/>
+                    </a:lnL>
+                    <a:lnR w="12700" cmpd="sng">
+                      <a:noFill/>
+                    </a:lnR>
+                    <a:lnT w="12700" cmpd="sng">
+                      <a:noFill/>
+                    </a:lnT>
+                    <a:lnB w="38100" cmpd="sng">
+                      <a:noFill/>
+                    </a:lnB>
+                    <a:lnTlToBr w="12700" cmpd="sng">
+                      <a:noFill/>
+                      <a:prstDash val="solid"/>
+                    </a:lnTlToBr>
+                    <a:lnBlToTr w="12700" cmpd="sng">
+                      <a:noFill/>
+                      <a:prstDash val="solid"/>
+                    </a:lnBlToTr>
+                    <a:solidFill>
+                      <a:srgbClr val="28AFB0"/>
+                    </a:solidFill>
+                  </a:tcPr>
+                </a:tc>
+                <a:tc>
+                  <a:txBody>
+                    <a:bodyPr/>
+                    <a:lstStyle/>
+                    <a:p>
+                      <a:pPr algn="ctr"/>
+                      <a:r>
+                        <a:rPr lang="en-US" sz="1800" b="0" i="0" u="none" strike="noStrike" kern="1200" cap="none" dirty="0">
+                          <a:ln>
+                            <a:noFill/>
+                          </a:ln>
+                          <a:solidFill>
+                            <a:srgbClr val="FFFFFF"/>
+                          </a:solidFill>
+                          <a:latin typeface="Pothana2000" pitchFamily="18"/>
+                          <a:ea typeface="DejaVu Sans" pitchFamily="2"/>
+                          <a:cs typeface="DejaVu Sans" pitchFamily="2"/>
+                        </a:rPr>
+                        <a:t>Add</a:t>
+                      </a:r>
+                      <a:endParaRPr lang="en-AU" dirty="0"/>
+                    </a:p>
+                  </a:txBody>
+                  <a:tcPr>
+                    <a:lnL w="12700" cmpd="sng">
+                      <a:noFill/>
+                    </a:lnL>
+                    <a:lnR w="12700" cmpd="sng">
+                      <a:noFill/>
+                    </a:lnR>
+                    <a:lnT w="12700" cmpd="sng">
+                      <a:noFill/>
+                    </a:lnT>
+                    <a:lnB w="38100" cmpd="sng">
+                      <a:noFill/>
+                    </a:lnB>
+                    <a:lnTlToBr w="12700" cmpd="sng">
+                      <a:noFill/>
+                      <a:prstDash val="solid"/>
+                    </a:lnTlToBr>
+                    <a:lnBlToTr w="12700" cmpd="sng">
+                      <a:noFill/>
+                      <a:prstDash val="solid"/>
+                    </a:lnBlToTr>
+                    <a:solidFill>
+                      <a:srgbClr val="19647E"/>
+                    </a:solidFill>
+                  </a:tcPr>
+                </a:tc>
+                <a:extLst>
+                  <a:ext uri="{0D108BD9-81ED-4DB2-BD59-A6C34878D82A}">
+                    <a16:rowId xmlns:a16="http://schemas.microsoft.com/office/drawing/2014/main" val="2349748964"/>
+                  </a:ext>
+                </a:extLst>
+              </a:tr>
+            </a:tbl>
+          </a:graphicData>
+        </a:graphic>
+      </p:graphicFrame>
+      <p:sp>
+        <p:nvSpPr>
+          <p:cNvPr id="62" name="Titel 3">
+            <a:extLst>
+              <a:ext uri="{FF2B5EF4-FFF2-40B4-BE49-F238E27FC236}">
+                <a16:creationId xmlns:a16="http://schemas.microsoft.com/office/drawing/2014/main" id="{2BB35323-D530-4ECE-85F3-7C8EAC39654F}"/>
+              </a:ext>
+            </a:extLst>
+          </p:cNvPr>
+          <p:cNvSpPr txBox="1">
+            <a:spLocks/>
+          </p:cNvSpPr>
+          <p:nvPr/>
+        </p:nvSpPr>
+        <p:spPr>
+          <a:xfrm>
+            <a:off x="503999" y="301320"/>
+            <a:ext cx="8208000" cy="745200"/>
+          </a:xfrm>
+          <a:prstGeom prst="rect">
+            <a:avLst/>
+          </a:prstGeom>
+        </p:spPr>
+        <p:txBody>
+          <a:bodyPr/>
+          <a:lstStyle>
+            <a:lvl1pPr lvl="0" algn="ctr" hangingPunct="0">
+              <a:buNone/>
+              <a:tabLst/>
+              <a:defRPr lang="en-US" sz="3600" b="0" i="0" u="none" strike="noStrike" kern="1200" cap="none">
+                <a:ln>
+                  <a:noFill/>
+                </a:ln>
+                <a:solidFill>
+                  <a:schemeClr val="bg1"/>
+                </a:solidFill>
+                <a:highlight>
+                  <a:scrgbClr r="0" g="0" b="0">
+                    <a:alpha val="0"/>
+                  </a:scrgbClr>
+                </a:highlight>
+                <a:latin typeface="Liberation Sans" pitchFamily="18"/>
+                <a:ea typeface="DejaVu Sans" pitchFamily="2"/>
+                <a:cs typeface="DejaVu Sans" pitchFamily="2"/>
+              </a:defRPr>
+            </a:lvl1pPr>
+          </a:lstStyle>
+          <a:p>
+            <a:r>
+              <a:rPr lang="en-US" dirty="0"/>
+              <a:t>Deck List View</a:t>
+            </a:r>
+            <a:endParaRPr lang="en-AU" dirty="0"/>
+          </a:p>
+        </p:txBody>
+      </p:sp>
+      <p:grpSp>
+        <p:nvGrpSpPr>
+          <p:cNvPr id="3" name="Gruppieren 2">
+            <a:extLst>
+              <a:ext uri="{FF2B5EF4-FFF2-40B4-BE49-F238E27FC236}">
+                <a16:creationId xmlns:a16="http://schemas.microsoft.com/office/drawing/2014/main" id="{BF026169-1E9F-41AD-AC0F-A2DD3011A3A9}"/>
+              </a:ext>
+            </a:extLst>
+          </p:cNvPr>
+          <p:cNvGrpSpPr/>
+          <p:nvPr/>
+        </p:nvGrpSpPr>
+        <p:grpSpPr>
+          <a:xfrm>
+            <a:off x="423318" y="1605452"/>
+            <a:ext cx="4704355" cy="5891009"/>
+            <a:chOff x="1864768" y="1765763"/>
+            <a:chExt cx="4704355" cy="5891009"/>
+          </a:xfrm>
+        </p:grpSpPr>
+        <p:grpSp>
+          <p:nvGrpSpPr>
+            <p:cNvPr id="5" name="Gruppieren 4">
+              <a:extLst>
+                <a:ext uri="{FF2B5EF4-FFF2-40B4-BE49-F238E27FC236}">
+                  <a16:creationId xmlns:a16="http://schemas.microsoft.com/office/drawing/2014/main" id="{E27F5A0A-732F-45CA-9888-1A94E6572BDB}"/>
+                </a:ext>
+              </a:extLst>
+            </p:cNvPr>
+            <p:cNvGrpSpPr/>
+            <p:nvPr/>
+          </p:nvGrpSpPr>
+          <p:grpSpPr>
+            <a:xfrm>
+              <a:off x="1864768" y="1765763"/>
+              <a:ext cx="4704355" cy="5891009"/>
+              <a:chOff x="1658345" y="1738516"/>
+              <a:chExt cx="5980706" cy="5891009"/>
+            </a:xfrm>
+          </p:grpSpPr>
+          <p:sp>
+            <p:nvSpPr>
+              <p:cNvPr id="44" name="Rechteck 43">
+                <a:extLst>
+                  <a:ext uri="{FF2B5EF4-FFF2-40B4-BE49-F238E27FC236}">
+                    <a16:creationId xmlns:a16="http://schemas.microsoft.com/office/drawing/2014/main" id="{81AB474E-AF56-4283-AFF7-9AE8545752A7}"/>
+                  </a:ext>
+                </a:extLst>
+              </p:cNvPr>
+              <p:cNvSpPr/>
+              <p:nvPr/>
+            </p:nvSpPr>
+            <p:spPr>
+              <a:xfrm>
+                <a:off x="1662321" y="1746388"/>
+                <a:ext cx="5976730" cy="5883137"/>
+              </a:xfrm>
+              <a:prstGeom prst="rect">
+                <a:avLst/>
+              </a:prstGeom>
+              <a:noFill/>
+            </p:spPr>
+            <p:style>
+              <a:lnRef idx="2">
+                <a:schemeClr val="accent1">
+                  <a:shade val="50000"/>
+                </a:schemeClr>
+              </a:lnRef>
+              <a:fillRef idx="1">
+                <a:schemeClr val="accent1"/>
+              </a:fillRef>
+              <a:effectRef idx="0">
+                <a:schemeClr val="accent1"/>
+              </a:effectRef>
+              <a:fontRef idx="minor">
+                <a:schemeClr val="lt1"/>
+              </a:fontRef>
+            </p:style>
+            <p:txBody>
+              <a:bodyPr rtlCol="0" anchor="ctr"/>
+              <a:lstStyle/>
+              <a:p>
+                <a:pPr algn="ctr"/>
+                <a:endParaRPr lang="en-AU"/>
+              </a:p>
+            </p:txBody>
+          </p:sp>
+          <p:grpSp>
+            <p:nvGrpSpPr>
+              <p:cNvPr id="2" name="Gruppieren 1">
+                <a:extLst>
+                  <a:ext uri="{FF2B5EF4-FFF2-40B4-BE49-F238E27FC236}">
+                    <a16:creationId xmlns:a16="http://schemas.microsoft.com/office/drawing/2014/main" id="{1FDC0EFF-D425-4288-A130-602D18D3BEB7}"/>
+                  </a:ext>
+                </a:extLst>
+              </p:cNvPr>
+              <p:cNvGrpSpPr/>
+              <p:nvPr/>
+            </p:nvGrpSpPr>
+            <p:grpSpPr>
+              <a:xfrm>
+                <a:off x="1658345" y="1738516"/>
+                <a:ext cx="5976730" cy="2292393"/>
+                <a:chOff x="1658345" y="1738516"/>
+                <a:chExt cx="5976730" cy="2292393"/>
+              </a:xfrm>
+            </p:grpSpPr>
+            <p:grpSp>
+              <p:nvGrpSpPr>
+                <p:cNvPr id="31" name="Gruppieren 30">
+                  <a:extLst>
+                    <a:ext uri="{FF2B5EF4-FFF2-40B4-BE49-F238E27FC236}">
+                      <a16:creationId xmlns:a16="http://schemas.microsoft.com/office/drawing/2014/main" id="{4F4DEF71-4875-4679-926E-F77DE6187059}"/>
+                    </a:ext>
+                  </a:extLst>
+                </p:cNvPr>
+                <p:cNvGrpSpPr/>
+                <p:nvPr/>
+              </p:nvGrpSpPr>
+              <p:grpSpPr>
+                <a:xfrm>
+                  <a:off x="1658345" y="1738516"/>
+                  <a:ext cx="5976730" cy="745200"/>
+                  <a:chOff x="274320" y="3749040"/>
+                  <a:chExt cx="8595360" cy="1554479"/>
+                </a:xfrm>
+              </p:grpSpPr>
+              <p:sp>
+                <p:nvSpPr>
+                  <p:cNvPr id="42" name="Freihandform: Form 41">
+                    <a:extLst>
+                      <a:ext uri="{FF2B5EF4-FFF2-40B4-BE49-F238E27FC236}">
+                        <a16:creationId xmlns:a16="http://schemas.microsoft.com/office/drawing/2014/main" id="{1EEBB0A9-F827-4341-8E50-7E149A39BC9A}"/>
+                      </a:ext>
+                    </a:extLst>
+                  </p:cNvPr>
+                  <p:cNvSpPr/>
+                  <p:nvPr/>
+                </p:nvSpPr>
+                <p:spPr>
+                  <a:xfrm>
+                    <a:off x="274320" y="3749040"/>
+                    <a:ext cx="8595360" cy="1554479"/>
+                  </a:xfrm>
+                  <a:custGeom>
+                    <a:avLst/>
+                    <a:gdLst>
+                      <a:gd name="f0" fmla="val 0"/>
+                      <a:gd name="f1" fmla="val 21600"/>
+                    </a:gdLst>
+                    <a:ahLst/>
+                    <a:cxnLst>
+                      <a:cxn ang="3cd4">
+                        <a:pos x="hc" y="t"/>
+                      </a:cxn>
+                      <a:cxn ang="0">
+                        <a:pos x="r" y="vc"/>
+                      </a:cxn>
+                      <a:cxn ang="cd4">
+                        <a:pos x="hc" y="b"/>
+                      </a:cxn>
+                      <a:cxn ang="cd2">
+                        <a:pos x="l" y="vc"/>
+                      </a:cxn>
+                    </a:cxnLst>
+                    <a:rect l="l" t="t" r="r" b="b"/>
+                    <a:pathLst>
+                      <a:path w="21600" h="21600">
+                        <a:moveTo>
+                          <a:pt x="f0" y="f0"/>
+                        </a:moveTo>
+                        <a:lnTo>
+                          <a:pt x="f1" y="f0"/>
+                        </a:lnTo>
+                        <a:lnTo>
+                          <a:pt x="f1" y="f1"/>
+                        </a:lnTo>
+                        <a:lnTo>
+                          <a:pt x="f0" y="f1"/>
+                        </a:lnTo>
+                        <a:lnTo>
+                          <a:pt x="f0" y="f0"/>
+                        </a:lnTo>
+                        <a:close/>
+                      </a:path>
+                    </a:pathLst>
+                  </a:custGeom>
+                  <a:solidFill>
+                    <a:srgbClr val="19647E"/>
+                  </a:solidFill>
+                  <a:ln w="0">
+                    <a:solidFill>
+                      <a:srgbClr val="3465A4"/>
+                    </a:solidFill>
+                    <a:prstDash val="solid"/>
+                    <a:bevel/>
+                  </a:ln>
+                </p:spPr>
+                <p:txBody>
+                  <a:bodyPr wrap="none" lIns="90000" tIns="45000" rIns="90000" bIns="45000" anchor="ctr" anchorCtr="0" compatLnSpc="0">
+                    <a:noAutofit/>
+                  </a:bodyPr>
+                  <a:lstStyle/>
+                  <a:p>
+                    <a:pPr marL="0" marR="0" lvl="0" indent="0" hangingPunct="0">
+                      <a:lnSpc>
+                        <a:spcPct val="100000"/>
+                      </a:lnSpc>
+                      <a:spcBef>
+                        <a:spcPts val="0"/>
+                      </a:spcBef>
+                      <a:spcAft>
+                        <a:spcPts val="0"/>
+                      </a:spcAft>
+                      <a:buNone/>
+                      <a:tabLst/>
+                    </a:pPr>
+                    <a:endParaRPr lang="en-US" sz="1800" b="0" i="0" u="none" strike="noStrike" kern="1200" cap="none" dirty="0">
+                      <a:ln>
+                        <a:noFill/>
+                      </a:ln>
+                      <a:latin typeface="Liberation Sans" pitchFamily="18"/>
+                      <a:ea typeface="DejaVu Sans" pitchFamily="2"/>
+                      <a:cs typeface="DejaVu Sans" pitchFamily="2"/>
+                    </a:endParaRPr>
+                  </a:p>
+                </p:txBody>
+              </p:sp>
+              <p:sp>
+                <p:nvSpPr>
+                  <p:cNvPr id="39" name="Textfeld 38">
+                    <a:extLst>
+                      <a:ext uri="{FF2B5EF4-FFF2-40B4-BE49-F238E27FC236}">
+                        <a16:creationId xmlns:a16="http://schemas.microsoft.com/office/drawing/2014/main" id="{302E0C61-CEF1-47A8-BFBF-C1380D62CBC4}"/>
+                      </a:ext>
+                    </a:extLst>
+                  </p:cNvPr>
+                  <p:cNvSpPr txBox="1"/>
+                  <p:nvPr/>
+                </p:nvSpPr>
+                <p:spPr>
+                  <a:xfrm>
+                    <a:off x="3739403" y="3909924"/>
+                    <a:ext cx="1946355" cy="676092"/>
+                  </a:xfrm>
+                  <a:prstGeom prst="rect">
+                    <a:avLst/>
+                  </a:prstGeom>
+                  <a:noFill/>
+                  <a:ln>
+                    <a:noFill/>
+                  </a:ln>
+                </p:spPr>
+                <p:txBody>
+                  <a:bodyPr wrap="none" lIns="90000" tIns="45000" rIns="90000" bIns="45000" anchorCtr="0" compatLnSpc="0">
+                    <a:spAutoFit/>
+                  </a:bodyPr>
+                  <a:lstStyle/>
+                  <a:p>
+                    <a:pPr marL="0" marR="0" lvl="0" indent="0" algn="ctr" hangingPunct="0">
+                      <a:lnSpc>
+                        <a:spcPct val="100000"/>
+                      </a:lnSpc>
+                      <a:spcBef>
+                        <a:spcPts val="0"/>
+                      </a:spcBef>
+                      <a:spcAft>
+                        <a:spcPts val="0"/>
+                      </a:spcAft>
+                      <a:buNone/>
+                      <a:tabLst/>
+                      <a:defRPr sz="2600" b="1">
+                        <a:solidFill>
+                          <a:srgbClr val="FFFFFF"/>
+                        </a:solidFill>
+                        <a:latin typeface="Helvetica" pitchFamily="32"/>
+                      </a:defRPr>
+                    </a:pPr>
+                    <a:r>
+                      <a:rPr lang="en-US" sz="2600" b="1" dirty="0">
+                        <a:solidFill>
+                          <a:srgbClr val="FFFFFF"/>
+                        </a:solidFill>
+                        <a:latin typeface="Helvetica" pitchFamily="34"/>
+                        <a:ea typeface="DejaVu Sans" pitchFamily="2"/>
+                        <a:cs typeface="DejaVu Sans" pitchFamily="2"/>
+                      </a:rPr>
+                      <a:t>Flashcards</a:t>
+                    </a:r>
+                    <a:endParaRPr lang="en-US" sz="2600" b="1" i="0" u="none" strike="noStrike" kern="1200" cap="none" dirty="0">
+                      <a:ln>
+                        <a:noFill/>
+                      </a:ln>
+                      <a:solidFill>
+                        <a:srgbClr val="FFFFFF"/>
+                      </a:solidFill>
+                      <a:latin typeface="Helvetica" pitchFamily="34"/>
+                      <a:ea typeface="DejaVu Sans" pitchFamily="2"/>
+                      <a:cs typeface="DejaVu Sans" pitchFamily="2"/>
+                    </a:endParaRPr>
+                  </a:p>
+                </p:txBody>
+              </p:sp>
+            </p:grpSp>
+            <p:grpSp>
+              <p:nvGrpSpPr>
+                <p:cNvPr id="13" name="Gruppieren 12">
+                  <a:extLst>
+                    <a:ext uri="{FF2B5EF4-FFF2-40B4-BE49-F238E27FC236}">
+                      <a16:creationId xmlns:a16="http://schemas.microsoft.com/office/drawing/2014/main" id="{99AD1545-B6AE-4E4F-97B5-F643491B020F}"/>
+                    </a:ext>
+                  </a:extLst>
+                </p:cNvPr>
+                <p:cNvGrpSpPr/>
+                <p:nvPr/>
+              </p:nvGrpSpPr>
+              <p:grpSpPr>
+                <a:xfrm>
+                  <a:off x="2129340" y="2832346"/>
+                  <a:ext cx="5110105" cy="1198563"/>
+                  <a:chOff x="2464089" y="3779837"/>
+                  <a:chExt cx="5110105" cy="1198563"/>
+                </a:xfrm>
+              </p:grpSpPr>
+              <p:sp>
+                <p:nvSpPr>
+                  <p:cNvPr id="89" name="Rechteck: abgerundete Ecken 88">
+                    <a:hlinkClick r:id="rId3" action="ppaction://hlinksldjump"/>
+                    <a:extLst>
+                      <a:ext uri="{FF2B5EF4-FFF2-40B4-BE49-F238E27FC236}">
+                        <a16:creationId xmlns:a16="http://schemas.microsoft.com/office/drawing/2014/main" id="{65B502A5-24BC-4B96-8B6C-D6AF3BEA8430}"/>
+                      </a:ext>
+                    </a:extLst>
+                  </p:cNvPr>
+                  <p:cNvSpPr/>
+                  <p:nvPr/>
+                </p:nvSpPr>
+                <p:spPr>
+                  <a:xfrm>
+                    <a:off x="2464089" y="3779837"/>
+                    <a:ext cx="5110105" cy="1198563"/>
+                  </a:xfrm>
+                  <a:prstGeom prst="roundRect">
+                    <a:avLst/>
+                  </a:prstGeom>
+                  <a:noFill/>
+                </p:spPr>
+                <p:style>
+                  <a:lnRef idx="2">
+                    <a:schemeClr val="accent1">
+                      <a:shade val="50000"/>
+                    </a:schemeClr>
+                  </a:lnRef>
+                  <a:fillRef idx="1">
+                    <a:schemeClr val="accent1"/>
+                  </a:fillRef>
+                  <a:effectRef idx="0">
+                    <a:schemeClr val="accent1"/>
+                  </a:effectRef>
+                  <a:fontRef idx="minor">
+                    <a:schemeClr val="lt1"/>
+                  </a:fontRef>
+                </p:style>
+                <p:txBody>
+                  <a:bodyPr rtlCol="0" anchor="ctr"/>
+                  <a:lstStyle/>
+                  <a:p>
+                    <a:pPr algn="ctr"/>
+                    <a:endParaRPr lang="en-AU" dirty="0"/>
+                  </a:p>
+                </p:txBody>
+              </p:sp>
+              <p:sp>
+                <p:nvSpPr>
+                  <p:cNvPr id="90" name="Textfeld 89">
+                    <a:extLst>
+                      <a:ext uri="{FF2B5EF4-FFF2-40B4-BE49-F238E27FC236}">
+                        <a16:creationId xmlns:a16="http://schemas.microsoft.com/office/drawing/2014/main" id="{D57C6199-4D54-415B-87B8-FC0C7107FA6B}"/>
+                      </a:ext>
+                    </a:extLst>
+                  </p:cNvPr>
+                  <p:cNvSpPr txBox="1"/>
+                  <p:nvPr/>
+                </p:nvSpPr>
+                <p:spPr>
+                  <a:xfrm>
+                    <a:off x="3045648" y="4025578"/>
+                    <a:ext cx="3871620" cy="474254"/>
+                  </a:xfrm>
+                  <a:prstGeom prst="rect">
+                    <a:avLst/>
+                  </a:prstGeom>
+                  <a:noFill/>
+                  <a:ln>
+                    <a:noFill/>
+                  </a:ln>
+                </p:spPr>
+                <p:txBody>
+                  <a:bodyPr wrap="square" lIns="90000" tIns="45000" rIns="90000" bIns="45000" anchorCtr="0" compatLnSpc="0">
+                    <a:spAutoFit/>
+                  </a:bodyPr>
+                  <a:lstStyle/>
+                  <a:p>
+                    <a:pPr lvl="0" algn="ctr" hangingPunct="0">
+                      <a:defRPr sz="2600" b="1">
+                        <a:solidFill>
+                          <a:srgbClr val="FFFFFF"/>
+                        </a:solidFill>
+                        <a:latin typeface="Helvetica" pitchFamily="32"/>
+                      </a:defRPr>
+                    </a:pPr>
+                    <a:r>
+                      <a:rPr lang="en-US" b="1" dirty="0">
+                        <a:solidFill>
+                          <a:srgbClr val="19647E"/>
+                        </a:solidFill>
+                        <a:latin typeface="Helvetica" pitchFamily="34"/>
+                        <a:ea typeface="DejaVu Sans" pitchFamily="2"/>
+                        <a:cs typeface="DejaVu Sans" pitchFamily="2"/>
+                      </a:rPr>
+                      <a:t>REACT Course</a:t>
+                    </a:r>
+                    <a:endParaRPr lang="en-US" sz="1600" b="1" dirty="0">
+                      <a:solidFill>
+                        <a:srgbClr val="19647E"/>
+                      </a:solidFill>
+                      <a:latin typeface="Helvetica" pitchFamily="34"/>
+                      <a:ea typeface="DejaVu Sans" pitchFamily="2"/>
+                      <a:cs typeface="DejaVu Sans" pitchFamily="2"/>
+                    </a:endParaRPr>
+                  </a:p>
+                </p:txBody>
+              </p:sp>
+            </p:grpSp>
+          </p:grpSp>
+        </p:grpSp>
+        <p:sp>
+          <p:nvSpPr>
+            <p:cNvPr id="46" name="Textfeld 45">
+              <a:extLst>
+                <a:ext uri="{FF2B5EF4-FFF2-40B4-BE49-F238E27FC236}">
+                  <a16:creationId xmlns:a16="http://schemas.microsoft.com/office/drawing/2014/main" id="{785E43FF-6DAC-462B-8FC6-7F746D7B4FF2}"/>
+                </a:ext>
+              </a:extLst>
+            </p:cNvPr>
+            <p:cNvSpPr txBox="1"/>
+            <p:nvPr/>
+          </p:nvSpPr>
+          <p:spPr>
+            <a:xfrm>
+              <a:off x="3056974" y="3487189"/>
+              <a:ext cx="2323068" cy="372687"/>
+            </a:xfrm>
+            <a:prstGeom prst="rect">
+              <a:avLst/>
+            </a:prstGeom>
+            <a:noFill/>
+            <a:ln>
+              <a:noFill/>
+            </a:ln>
+          </p:spPr>
+          <p:txBody>
+            <a:bodyPr wrap="square" lIns="90000" tIns="45000" rIns="90000" bIns="45000" anchorCtr="0" compatLnSpc="0">
+              <a:spAutoFit/>
+            </a:bodyPr>
+            <a:lstStyle/>
+            <a:p>
+              <a:pPr algn="ctr"/>
+              <a:r>
+                <a:rPr lang="en-AU" dirty="0">
+                  <a:solidFill>
+                    <a:schemeClr val="tx1">
+                      <a:lumMod val="65000"/>
+                      <a:lumOff val="35000"/>
+                    </a:schemeClr>
+                  </a:solidFill>
+                </a:rPr>
+                <a:t>30 cards</a:t>
+              </a:r>
+            </a:p>
+          </p:txBody>
+        </p:sp>
+      </p:grpSp>
+      <p:sp>
+        <p:nvSpPr>
+          <p:cNvPr id="4" name="Rechteck 3">
+            <a:extLst>
+              <a:ext uri="{FF2B5EF4-FFF2-40B4-BE49-F238E27FC236}">
+                <a16:creationId xmlns:a16="http://schemas.microsoft.com/office/drawing/2014/main" id="{668D71C2-E725-451A-B588-1413991730BD}"/>
+              </a:ext>
+            </a:extLst>
+          </p:cNvPr>
+          <p:cNvSpPr/>
+          <p:nvPr/>
+        </p:nvSpPr>
+        <p:spPr>
+          <a:xfrm>
+            <a:off x="5377652" y="2160673"/>
+            <a:ext cx="4575973" cy="830997"/>
+          </a:xfrm>
+          <a:prstGeom prst="rect">
+            <a:avLst/>
+          </a:prstGeom>
+        </p:spPr>
+        <p:txBody>
+          <a:bodyPr wrap="square">
+            <a:spAutoFit/>
+          </a:bodyPr>
+          <a:lstStyle/>
+          <a:p>
+            <a:pPr marL="180975" indent="-180975">
+              <a:buFont typeface="+mj-lt"/>
+              <a:buAutoNum type="arabicPeriod"/>
+            </a:pPr>
+            <a:r>
+              <a:rPr lang="en-US" sz="1600" dirty="0"/>
+              <a:t>Deck List View (Default View)</a:t>
+            </a:r>
+          </a:p>
+          <a:p>
+            <a:pPr marL="447675" lvl="1" indent="-180975">
+              <a:buFont typeface="+mj-lt"/>
+              <a:buAutoNum type="arabicPeriod"/>
+            </a:pPr>
+            <a:r>
+              <a:rPr lang="en-US" sz="1600" dirty="0"/>
+              <a:t>displays the title of each Deck</a:t>
+            </a:r>
+          </a:p>
+          <a:p>
+            <a:pPr marL="447675" lvl="1" indent="-180975">
+              <a:buFont typeface="+mj-lt"/>
+              <a:buAutoNum type="arabicPeriod"/>
+            </a:pPr>
+            <a:r>
+              <a:rPr lang="en-US" sz="1600" dirty="0"/>
+              <a:t>displays the number of cards in each deck</a:t>
+            </a:r>
+          </a:p>
+        </p:txBody>
+      </p:sp>
+    </p:spTree>
+    <p:extLst>
+      <p:ext uri="{BB962C8B-B14F-4D97-AF65-F5344CB8AC3E}">
+        <p14:creationId xmlns:p14="http://schemas.microsoft.com/office/powerpoint/2010/main" val="1704947174"/>
+      </p:ext>
+    </p:extLst>
+  </p:cSld>
+  <p:clrMapOvr>
+    <a:masterClrMapping/>
+  </p:clrMapOvr>
+</p:sld>
+</file>
+
+<file path=ppt/slides/slide11.xml><?xml version="1.0" encoding="utf-8"?>
+<p:sld xmlns:a="http://schemas.openxmlformats.org/drawingml/2006/main" xmlns:r="http://schemas.openxmlformats.org/officeDocument/2006/relationships" xmlns:p="http://schemas.openxmlformats.org/presentationml/2006/main">
+  <p:cSld>
+    <p:spTree>
+      <p:nvGrpSpPr>
+        <p:cNvPr id="1" name=""/>
+        <p:cNvGrpSpPr/>
+        <p:nvPr/>
+      </p:nvGrpSpPr>
+      <p:grpSpPr>
+        <a:xfrm>
+          <a:off x="0" y="0"/>
+          <a:ext cx="0" cy="0"/>
+          <a:chOff x="0" y="0"/>
+          <a:chExt cx="0" cy="0"/>
+        </a:xfrm>
+      </p:grpSpPr>
+      <p:graphicFrame>
+        <p:nvGraphicFramePr>
+          <p:cNvPr id="45" name="Tabelle 37">
+            <a:extLst>
+              <a:ext uri="{FF2B5EF4-FFF2-40B4-BE49-F238E27FC236}">
+                <a16:creationId xmlns:a16="http://schemas.microsoft.com/office/drawing/2014/main" id="{5BBFA1E0-2CDB-4D7C-811D-141100FAB4F3}"/>
+              </a:ext>
+            </a:extLst>
+          </p:cNvPr>
+          <p:cNvGraphicFramePr>
+            <a:graphicFrameLocks noGrp="1"/>
+          </p:cNvGraphicFramePr>
           <p:nvPr>
             <p:extLst>
               <p:ext uri="{D42A27DB-BD31-4B8C-83A1-F6EECF244321}">
@@ -8705,7 +9482,7 @@
 </p:sld>
 </file>
 
-<file path=ppt/slides/slide11.xml><?xml version="1.0" encoding="utf-8"?>
+<file path=ppt/slides/slide12.xml><?xml version="1.0" encoding="utf-8"?>
 <p:sld xmlns:a="http://schemas.openxmlformats.org/drawingml/2006/main" xmlns:r="http://schemas.openxmlformats.org/officeDocument/2006/relationships" xmlns:p="http://schemas.openxmlformats.org/presentationml/2006/main">
   <p:cSld>
     <p:spTree>
@@ -9637,7 +10414,7 @@
 </p:sld>
 </file>
 
-<file path=ppt/slides/slide12.xml><?xml version="1.0" encoding="utf-8"?>
+<file path=ppt/slides/slide13.xml><?xml version="1.0" encoding="utf-8"?>
 <p:sld xmlns:a="http://schemas.openxmlformats.org/drawingml/2006/main" xmlns:r="http://schemas.openxmlformats.org/officeDocument/2006/relationships" xmlns:p="http://schemas.openxmlformats.org/presentationml/2006/main">
   <p:cSld>
     <p:spTree>
@@ -10746,7 +11523,7 @@
 </p:sld>
 </file>
 
-<file path=ppt/slides/slide13.xml><?xml version="1.0" encoding="utf-8"?>
+<file path=ppt/slides/slide14.xml><?xml version="1.0" encoding="utf-8"?>
 <p:sld xmlns:a="http://schemas.openxmlformats.org/drawingml/2006/main" xmlns:r="http://schemas.openxmlformats.org/officeDocument/2006/relationships" xmlns:p="http://schemas.openxmlformats.org/presentationml/2006/main">
   <p:cSld>
     <p:spTree>
@@ -11977,7 +12754,7 @@
 </p:sld>
 </file>
 
-<file path=ppt/slides/slide14.xml><?xml version="1.0" encoding="utf-8"?>
+<file path=ppt/slides/slide15.xml><?xml version="1.0" encoding="utf-8"?>
 <p:sld xmlns:a="http://schemas.openxmlformats.org/drawingml/2006/main" xmlns:r="http://schemas.openxmlformats.org/officeDocument/2006/relationships" xmlns:p="http://schemas.openxmlformats.org/presentationml/2006/main">
   <p:cSld>
     <p:spTree>
@@ -12871,7 +13648,7 @@
 </p:sld>
 </file>
 
-<file path=ppt/slides/slide15.xml><?xml version="1.0" encoding="utf-8"?>
+<file path=ppt/slides/slide16.xml><?xml version="1.0" encoding="utf-8"?>
 <p:sld xmlns:a="http://schemas.openxmlformats.org/drawingml/2006/main" xmlns:r="http://schemas.openxmlformats.org/officeDocument/2006/relationships" xmlns:p="http://schemas.openxmlformats.org/presentationml/2006/main">
   <p:cSld>
     <p:spTree>
@@ -13187,7 +13964,7 @@
 </p:sld>
 </file>
 
-<file path=ppt/slides/slide16.xml><?xml version="1.0" encoding="utf-8"?>
+<file path=ppt/slides/slide17.xml><?xml version="1.0" encoding="utf-8"?>
 <p:sld xmlns:a="http://schemas.openxmlformats.org/drawingml/2006/main" xmlns:r="http://schemas.openxmlformats.org/officeDocument/2006/relationships" xmlns:p="http://schemas.openxmlformats.org/presentationml/2006/main">
   <p:cSld>
     <p:spTree>
@@ -19353,6 +20130,1223 @@
           <a:chExt cx="0" cy="0"/>
         </a:xfrm>
       </p:grpSpPr>
+      <p:sp>
+        <p:nvSpPr>
+          <p:cNvPr id="2" name="Titel 1">
+            <a:extLst>
+              <a:ext uri="{FF2B5EF4-FFF2-40B4-BE49-F238E27FC236}">
+                <a16:creationId xmlns:a16="http://schemas.microsoft.com/office/drawing/2014/main" id="{8FB2A6BA-D9FA-4684-966D-3F41082CE51F}"/>
+              </a:ext>
+            </a:extLst>
+          </p:cNvPr>
+          <p:cNvSpPr>
+            <a:spLocks noGrp="1"/>
+          </p:cNvSpPr>
+          <p:nvPr>
+            <p:ph type="title"/>
+          </p:nvPr>
+        </p:nvSpPr>
+        <p:spPr/>
+        <p:txBody>
+          <a:bodyPr/>
+          <a:lstStyle/>
+          <a:p>
+            <a:r>
+              <a:rPr lang="en-AU" dirty="0"/>
+              <a:t>Store</a:t>
+            </a:r>
+          </a:p>
+        </p:txBody>
+      </p:sp>
+      <p:sp>
+        <p:nvSpPr>
+          <p:cNvPr id="5" name="Rectangle 2">
+            <a:extLst>
+              <a:ext uri="{FF2B5EF4-FFF2-40B4-BE49-F238E27FC236}">
+                <a16:creationId xmlns:a16="http://schemas.microsoft.com/office/drawing/2014/main" id="{82CB7337-061C-44C7-8760-03AEA4A9C515}"/>
+              </a:ext>
+            </a:extLst>
+          </p:cNvPr>
+          <p:cNvSpPr>
+            <a:spLocks noChangeArrowheads="1"/>
+          </p:cNvSpPr>
+          <p:nvPr/>
+        </p:nvSpPr>
+        <p:spPr bwMode="auto">
+          <a:xfrm>
+            <a:off x="184786" y="2081823"/>
+            <a:ext cx="9387840" cy="3970318"/>
+          </a:xfrm>
+          <a:prstGeom prst="rect">
+            <a:avLst/>
+          </a:prstGeom>
+          <a:solidFill>
+            <a:schemeClr val="tx1">
+              <a:lumMod val="95000"/>
+              <a:lumOff val="5000"/>
+            </a:schemeClr>
+          </a:solidFill>
+          <a:ln>
+            <a:noFill/>
+          </a:ln>
+          <a:effectLst/>
+        </p:spPr>
+        <p:txBody>
+          <a:bodyPr vert="horz" wrap="square" lIns="91440" tIns="45720" rIns="91440" bIns="45720" numCol="1" anchor="ctr" anchorCtr="0" compatLnSpc="1">
+            <a:prstTxWarp prst="textNoShape">
+              <a:avLst/>
+            </a:prstTxWarp>
+            <a:spAutoFit/>
+          </a:bodyPr>
+          <a:lstStyle/>
+          <a:p>
+            <a:pPr marL="0" marR="0" lvl="0" indent="0" algn="l" defTabSz="914400" rtl="0" eaLnBrk="0" fontAlgn="base" latinLnBrk="0" hangingPunct="0">
+              <a:lnSpc>
+                <a:spcPct val="100000"/>
+              </a:lnSpc>
+              <a:spcBef>
+                <a:spcPct val="0"/>
+              </a:spcBef>
+              <a:spcAft>
+                <a:spcPct val="0"/>
+              </a:spcAft>
+              <a:buClrTx/>
+              <a:buSzTx/>
+              <a:buFontTx/>
+              <a:buNone/>
+              <a:tabLst/>
+            </a:pPr>
+            <a:r>
+              <a:rPr kumimoji="0" lang="de-DE" altLang="de-DE" b="0" i="0" u="none" strike="noStrike" cap="none" normalizeH="0" baseline="0" dirty="0">
+                <a:ln>
+                  <a:noFill/>
+                </a:ln>
+                <a:solidFill>
+                  <a:srgbClr val="A9B7C6"/>
+                </a:solidFill>
+                <a:effectLst/>
+                <a:latin typeface="JetBrains Mono"/>
+              </a:rPr>
+              <a:t>Store={</a:t>
+            </a:r>
+            <a:br>
+              <a:rPr kumimoji="0" lang="de-DE" altLang="de-DE" b="0" i="0" u="none" strike="noStrike" cap="none" normalizeH="0" baseline="0" dirty="0">
+                <a:ln>
+                  <a:noFill/>
+                </a:ln>
+                <a:solidFill>
+                  <a:srgbClr val="A9B7C6"/>
+                </a:solidFill>
+                <a:effectLst/>
+                <a:latin typeface="JetBrains Mono"/>
+              </a:rPr>
+            </a:br>
+            <a:r>
+              <a:rPr kumimoji="0" lang="de-DE" altLang="de-DE" b="0" i="0" u="none" strike="noStrike" cap="none" normalizeH="0" baseline="0" dirty="0">
+                <a:ln>
+                  <a:noFill/>
+                </a:ln>
+                <a:solidFill>
+                  <a:srgbClr val="A9B7C6"/>
+                </a:solidFill>
+                <a:effectLst/>
+                <a:latin typeface="JetBrains Mono"/>
+              </a:rPr>
+              <a:t>    </a:t>
+            </a:r>
+            <a:r>
+              <a:rPr kumimoji="0" lang="de-DE" altLang="de-DE" b="0" i="0" u="none" strike="noStrike" cap="none" normalizeH="0" baseline="0" dirty="0" err="1">
+                <a:ln>
+                  <a:noFill/>
+                </a:ln>
+                <a:solidFill>
+                  <a:srgbClr val="9876AA"/>
+                </a:solidFill>
+                <a:effectLst/>
+                <a:latin typeface="JetBrains Mono"/>
+              </a:rPr>
+              <a:t>decks</a:t>
+            </a:r>
+            <a:r>
+              <a:rPr kumimoji="0" lang="de-DE" altLang="de-DE" b="0" i="0" u="none" strike="noStrike" cap="none" normalizeH="0" baseline="0" dirty="0">
+                <a:ln>
+                  <a:noFill/>
+                </a:ln>
+                <a:solidFill>
+                  <a:srgbClr val="A9B7C6"/>
+                </a:solidFill>
+                <a:effectLst/>
+                <a:latin typeface="JetBrains Mono"/>
+              </a:rPr>
+              <a:t>:{</a:t>
+            </a:r>
+            <a:br>
+              <a:rPr kumimoji="0" lang="de-DE" altLang="de-DE" b="0" i="0" u="none" strike="noStrike" cap="none" normalizeH="0" baseline="0" dirty="0">
+                <a:ln>
+                  <a:noFill/>
+                </a:ln>
+                <a:solidFill>
+                  <a:srgbClr val="A9B7C6"/>
+                </a:solidFill>
+                <a:effectLst/>
+                <a:latin typeface="JetBrains Mono"/>
+              </a:rPr>
+            </a:br>
+            <a:r>
+              <a:rPr kumimoji="0" lang="de-DE" altLang="de-DE" b="0" i="0" u="none" strike="noStrike" cap="none" normalizeH="0" baseline="0" dirty="0">
+                <a:ln>
+                  <a:noFill/>
+                </a:ln>
+                <a:solidFill>
+                  <a:srgbClr val="A9B7C6"/>
+                </a:solidFill>
+                <a:effectLst/>
+                <a:latin typeface="JetBrains Mono"/>
+              </a:rPr>
+              <a:t>        </a:t>
+            </a:r>
+            <a:r>
+              <a:rPr lang="de-DE" altLang="de-DE" dirty="0" err="1">
+                <a:solidFill>
+                  <a:srgbClr val="9876AA"/>
+                </a:solidFill>
+                <a:latin typeface="JetBrains Mono"/>
+              </a:rPr>
+              <a:t>Misc</a:t>
+            </a:r>
+            <a:r>
+              <a:rPr kumimoji="0" lang="de-DE" altLang="de-DE" b="0" i="0" u="none" strike="noStrike" cap="none" normalizeH="0" baseline="0" dirty="0">
+                <a:ln>
+                  <a:noFill/>
+                </a:ln>
+                <a:solidFill>
+                  <a:srgbClr val="A9B7C6"/>
+                </a:solidFill>
+                <a:effectLst/>
+                <a:latin typeface="JetBrains Mono"/>
+              </a:rPr>
+              <a:t>:[</a:t>
+            </a:r>
+            <a:br>
+              <a:rPr kumimoji="0" lang="de-DE" altLang="de-DE" b="0" i="0" u="none" strike="noStrike" cap="none" normalizeH="0" baseline="0" dirty="0">
+                <a:ln>
+                  <a:noFill/>
+                </a:ln>
+                <a:solidFill>
+                  <a:srgbClr val="A9B7C6"/>
+                </a:solidFill>
+                <a:effectLst/>
+                <a:latin typeface="JetBrains Mono"/>
+              </a:rPr>
+            </a:br>
+            <a:r>
+              <a:rPr kumimoji="0" lang="de-DE" altLang="de-DE" b="0" i="0" u="none" strike="noStrike" cap="none" normalizeH="0" baseline="0" dirty="0">
+                <a:ln>
+                  <a:noFill/>
+                </a:ln>
+                <a:solidFill>
+                  <a:srgbClr val="A9B7C6"/>
+                </a:solidFill>
+                <a:effectLst/>
+                <a:latin typeface="JetBrains Mono"/>
+              </a:rPr>
+              <a:t>            {</a:t>
+            </a:r>
+            <a:r>
+              <a:rPr kumimoji="0" lang="de-DE" altLang="de-DE" b="0" i="0" u="none" strike="noStrike" cap="none" normalizeH="0" baseline="0" dirty="0">
+                <a:ln>
+                  <a:noFill/>
+                </a:ln>
+                <a:solidFill>
+                  <a:srgbClr val="9876AA"/>
+                </a:solidFill>
+                <a:effectLst/>
+                <a:latin typeface="JetBrains Mono"/>
+              </a:rPr>
+              <a:t>id</a:t>
+            </a:r>
+            <a:r>
+              <a:rPr kumimoji="0" lang="de-DE" altLang="de-DE" b="0" i="0" u="none" strike="noStrike" cap="none" normalizeH="0" baseline="0" dirty="0">
+                <a:ln>
+                  <a:noFill/>
+                </a:ln>
+                <a:solidFill>
+                  <a:srgbClr val="A9B7C6"/>
+                </a:solidFill>
+                <a:effectLst/>
+                <a:latin typeface="JetBrains Mono"/>
+              </a:rPr>
+              <a:t>:</a:t>
+            </a:r>
+            <a:r>
+              <a:rPr kumimoji="0" lang="de-DE" altLang="de-DE" b="0" i="0" u="none" strike="noStrike" cap="none" normalizeH="0" baseline="0" dirty="0">
+                <a:ln>
+                  <a:noFill/>
+                </a:ln>
+                <a:solidFill>
+                  <a:srgbClr val="6897BB"/>
+                </a:solidFill>
+                <a:effectLst/>
+                <a:latin typeface="JetBrains Mono"/>
+              </a:rPr>
+              <a:t>1</a:t>
+            </a:r>
+            <a:r>
+              <a:rPr kumimoji="0" lang="de-DE" altLang="de-DE" b="0" i="0" u="none" strike="noStrike" cap="none" normalizeH="0" baseline="0" dirty="0">
+                <a:ln>
+                  <a:noFill/>
+                </a:ln>
+                <a:solidFill>
+                  <a:srgbClr val="CC7832"/>
+                </a:solidFill>
+                <a:effectLst/>
+                <a:latin typeface="JetBrains Mono"/>
+              </a:rPr>
+              <a:t>,</a:t>
+            </a:r>
+            <a:br>
+              <a:rPr kumimoji="0" lang="de-DE" altLang="de-DE" b="0" i="0" u="none" strike="noStrike" cap="none" normalizeH="0" baseline="0" dirty="0">
+                <a:ln>
+                  <a:noFill/>
+                </a:ln>
+                <a:solidFill>
+                  <a:srgbClr val="CC7832"/>
+                </a:solidFill>
+                <a:effectLst/>
+                <a:latin typeface="JetBrains Mono"/>
+              </a:rPr>
+            </a:br>
+            <a:r>
+              <a:rPr kumimoji="0" lang="de-DE" altLang="de-DE" b="0" i="0" u="none" strike="noStrike" cap="none" normalizeH="0" baseline="0" dirty="0">
+                <a:ln>
+                  <a:noFill/>
+                </a:ln>
+                <a:solidFill>
+                  <a:srgbClr val="CC7832"/>
+                </a:solidFill>
+                <a:effectLst/>
+                <a:latin typeface="JetBrains Mono"/>
+              </a:rPr>
+              <a:t>                </a:t>
+            </a:r>
+            <a:r>
+              <a:rPr kumimoji="0" lang="de-DE" altLang="de-DE" b="0" i="0" u="none" strike="noStrike" cap="none" normalizeH="0" baseline="0" dirty="0" err="1">
+                <a:ln>
+                  <a:noFill/>
+                </a:ln>
+                <a:solidFill>
+                  <a:srgbClr val="9876AA"/>
+                </a:solidFill>
+                <a:effectLst/>
+                <a:latin typeface="JetBrains Mono"/>
+              </a:rPr>
+              <a:t>question</a:t>
+            </a:r>
+            <a:r>
+              <a:rPr kumimoji="0" lang="de-DE" altLang="de-DE" b="0" i="0" u="none" strike="noStrike" cap="none" normalizeH="0" baseline="0" dirty="0">
+                <a:ln>
+                  <a:noFill/>
+                </a:ln>
+                <a:solidFill>
+                  <a:srgbClr val="A9B7C6"/>
+                </a:solidFill>
+                <a:effectLst/>
+                <a:latin typeface="JetBrains Mono"/>
+              </a:rPr>
+              <a:t>:</a:t>
+            </a:r>
+            <a:r>
+              <a:rPr kumimoji="0" lang="de-DE" altLang="de-DE" b="0" i="0" u="none" strike="noStrike" cap="none" normalizeH="0" baseline="0" dirty="0">
+                <a:ln>
+                  <a:noFill/>
+                </a:ln>
+                <a:solidFill>
+                  <a:srgbClr val="6A8759"/>
+                </a:solidFill>
+                <a:effectLst/>
+                <a:latin typeface="JetBrains Mono"/>
+              </a:rPr>
+              <a:t>"</a:t>
+            </a:r>
+            <a:r>
+              <a:rPr kumimoji="0" lang="de-DE" altLang="de-DE" b="0" i="0" u="none" strike="noStrike" cap="none" normalizeH="0" baseline="0" dirty="0" err="1">
+                <a:ln>
+                  <a:noFill/>
+                </a:ln>
+                <a:solidFill>
+                  <a:srgbClr val="6A8759"/>
+                </a:solidFill>
+                <a:effectLst/>
+                <a:latin typeface="JetBrains Mono"/>
+              </a:rPr>
+              <a:t>What</a:t>
+            </a:r>
+            <a:r>
+              <a:rPr kumimoji="0" lang="de-DE" altLang="de-DE" b="0" i="0" u="none" strike="noStrike" cap="none" normalizeH="0" baseline="0" dirty="0">
+                <a:ln>
+                  <a:noFill/>
+                </a:ln>
+                <a:solidFill>
+                  <a:srgbClr val="6A8759"/>
+                </a:solidFill>
+                <a:effectLst/>
+                <a:latin typeface="JetBrains Mono"/>
+              </a:rPr>
+              <a:t> </a:t>
+            </a:r>
+            <a:r>
+              <a:rPr kumimoji="0" lang="de-DE" altLang="de-DE" b="0" i="0" u="none" strike="noStrike" cap="none" normalizeH="0" baseline="0" dirty="0" err="1">
+                <a:ln>
+                  <a:noFill/>
+                </a:ln>
+                <a:solidFill>
+                  <a:srgbClr val="6A8759"/>
+                </a:solidFill>
+                <a:effectLst/>
+                <a:latin typeface="JetBrains Mono"/>
+              </a:rPr>
+              <a:t>is</a:t>
+            </a:r>
+            <a:r>
+              <a:rPr kumimoji="0" lang="de-DE" altLang="de-DE" b="0" i="0" u="none" strike="noStrike" cap="none" normalizeH="0" baseline="0" dirty="0">
+                <a:ln>
+                  <a:noFill/>
+                </a:ln>
+                <a:solidFill>
+                  <a:srgbClr val="6A8759"/>
+                </a:solidFill>
+                <a:effectLst/>
+                <a:latin typeface="JetBrains Mono"/>
+              </a:rPr>
+              <a:t> </a:t>
+            </a:r>
+            <a:r>
+              <a:rPr kumimoji="0" lang="de-DE" altLang="de-DE" b="0" i="0" u="none" strike="noStrike" cap="none" normalizeH="0" baseline="0" dirty="0" err="1">
+                <a:ln>
+                  <a:noFill/>
+                </a:ln>
+                <a:solidFill>
+                  <a:srgbClr val="6A8759"/>
+                </a:solidFill>
+                <a:effectLst/>
+                <a:latin typeface="JetBrains Mono"/>
+              </a:rPr>
+              <a:t>green</a:t>
+            </a:r>
+            <a:r>
+              <a:rPr kumimoji="0" lang="de-DE" altLang="de-DE" b="0" i="0" u="none" strike="noStrike" cap="none" normalizeH="0" baseline="0" dirty="0">
+                <a:ln>
+                  <a:noFill/>
+                </a:ln>
+                <a:solidFill>
+                  <a:srgbClr val="6A8759"/>
+                </a:solidFill>
+                <a:effectLst/>
+                <a:latin typeface="JetBrains Mono"/>
+              </a:rPr>
+              <a:t>?"</a:t>
+            </a:r>
+            <a:r>
+              <a:rPr kumimoji="0" lang="de-DE" altLang="de-DE" b="0" i="0" u="none" strike="noStrike" cap="none" normalizeH="0" baseline="0" dirty="0">
+                <a:ln>
+                  <a:noFill/>
+                </a:ln>
+                <a:solidFill>
+                  <a:srgbClr val="CC7832"/>
+                </a:solidFill>
+                <a:effectLst/>
+                <a:latin typeface="JetBrains Mono"/>
+              </a:rPr>
+              <a:t>,</a:t>
+            </a:r>
+            <a:br>
+              <a:rPr kumimoji="0" lang="de-DE" altLang="de-DE" b="0" i="0" u="none" strike="noStrike" cap="none" normalizeH="0" baseline="0" dirty="0">
+                <a:ln>
+                  <a:noFill/>
+                </a:ln>
+                <a:solidFill>
+                  <a:srgbClr val="CC7832"/>
+                </a:solidFill>
+                <a:effectLst/>
+                <a:latin typeface="JetBrains Mono"/>
+              </a:rPr>
+            </a:br>
+            <a:r>
+              <a:rPr kumimoji="0" lang="de-DE" altLang="de-DE" b="0" i="0" u="none" strike="noStrike" cap="none" normalizeH="0" baseline="0" dirty="0">
+                <a:ln>
+                  <a:noFill/>
+                </a:ln>
+                <a:solidFill>
+                  <a:srgbClr val="CC7832"/>
+                </a:solidFill>
+                <a:effectLst/>
+                <a:latin typeface="JetBrains Mono"/>
+              </a:rPr>
+              <a:t>                </a:t>
+            </a:r>
+            <a:r>
+              <a:rPr kumimoji="0" lang="de-DE" altLang="de-DE" b="0" i="0" u="none" strike="noStrike" cap="none" normalizeH="0" baseline="0" dirty="0" err="1">
+                <a:ln>
+                  <a:noFill/>
+                </a:ln>
+                <a:solidFill>
+                  <a:srgbClr val="9876AA"/>
+                </a:solidFill>
+                <a:effectLst/>
+                <a:latin typeface="JetBrains Mono"/>
+              </a:rPr>
+              <a:t>answer</a:t>
+            </a:r>
+            <a:r>
+              <a:rPr kumimoji="0" lang="de-DE" altLang="de-DE" b="0" i="0" u="none" strike="noStrike" cap="none" normalizeH="0" baseline="0" dirty="0">
+                <a:ln>
+                  <a:noFill/>
+                </a:ln>
+                <a:solidFill>
+                  <a:srgbClr val="A9B7C6"/>
+                </a:solidFill>
+                <a:effectLst/>
+                <a:latin typeface="JetBrains Mono"/>
+              </a:rPr>
+              <a:t>:</a:t>
+            </a:r>
+            <a:r>
+              <a:rPr kumimoji="0" lang="de-DE" altLang="de-DE" b="0" i="0" u="none" strike="noStrike" cap="none" normalizeH="0" baseline="0" dirty="0">
+                <a:ln>
+                  <a:noFill/>
+                </a:ln>
+                <a:solidFill>
+                  <a:srgbClr val="6A8759"/>
+                </a:solidFill>
+                <a:effectLst/>
+                <a:latin typeface="JetBrains Mono"/>
+              </a:rPr>
+              <a:t>"Gras </a:t>
+            </a:r>
+            <a:r>
+              <a:rPr kumimoji="0" lang="de-DE" altLang="de-DE" b="0" i="0" u="none" strike="noStrike" cap="none" normalizeH="0" baseline="0" dirty="0" err="1">
+                <a:ln>
+                  <a:noFill/>
+                </a:ln>
+                <a:solidFill>
+                  <a:srgbClr val="6A8759"/>
+                </a:solidFill>
+                <a:effectLst/>
+                <a:latin typeface="JetBrains Mono"/>
+              </a:rPr>
+              <a:t>is</a:t>
+            </a:r>
+            <a:r>
+              <a:rPr kumimoji="0" lang="de-DE" altLang="de-DE" b="0" i="0" u="none" strike="noStrike" cap="none" normalizeH="0" baseline="0" dirty="0">
+                <a:ln>
+                  <a:noFill/>
+                </a:ln>
+                <a:solidFill>
+                  <a:srgbClr val="6A8759"/>
+                </a:solidFill>
+                <a:effectLst/>
+                <a:latin typeface="JetBrains Mono"/>
+              </a:rPr>
+              <a:t> </a:t>
+            </a:r>
+            <a:r>
+              <a:rPr kumimoji="0" lang="de-DE" altLang="de-DE" b="0" i="0" u="none" strike="noStrike" cap="none" normalizeH="0" baseline="0" dirty="0" err="1">
+                <a:ln>
+                  <a:noFill/>
+                </a:ln>
+                <a:solidFill>
+                  <a:srgbClr val="6A8759"/>
+                </a:solidFill>
+                <a:effectLst/>
+                <a:latin typeface="JetBrains Mono"/>
+              </a:rPr>
+              <a:t>green</a:t>
+            </a:r>
+            <a:r>
+              <a:rPr kumimoji="0" lang="de-DE" altLang="de-DE" b="0" i="0" u="none" strike="noStrike" cap="none" normalizeH="0" baseline="0" dirty="0">
+                <a:ln>
+                  <a:noFill/>
+                </a:ln>
+                <a:solidFill>
+                  <a:srgbClr val="6A8759"/>
+                </a:solidFill>
+                <a:effectLst/>
+                <a:latin typeface="JetBrains Mono"/>
+              </a:rPr>
+              <a:t>"</a:t>
+            </a:r>
+            <a:r>
+              <a:rPr kumimoji="0" lang="de-DE" altLang="de-DE" b="0" i="0" u="none" strike="noStrike" cap="none" normalizeH="0" baseline="0" dirty="0">
+                <a:ln>
+                  <a:noFill/>
+                </a:ln>
+                <a:solidFill>
+                  <a:srgbClr val="A9B7C6"/>
+                </a:solidFill>
+                <a:effectLst/>
+                <a:latin typeface="JetBrains Mono"/>
+              </a:rPr>
+              <a:t>}</a:t>
+            </a:r>
+            <a:r>
+              <a:rPr kumimoji="0" lang="de-DE" altLang="de-DE" b="0" i="0" u="none" strike="noStrike" cap="none" normalizeH="0" baseline="0" dirty="0">
+                <a:ln>
+                  <a:noFill/>
+                </a:ln>
+                <a:solidFill>
+                  <a:srgbClr val="CC7832"/>
+                </a:solidFill>
+                <a:effectLst/>
+                <a:latin typeface="JetBrains Mono"/>
+              </a:rPr>
+              <a:t>,</a:t>
+            </a:r>
+            <a:br>
+              <a:rPr kumimoji="0" lang="de-DE" altLang="de-DE" b="0" i="0" u="none" strike="noStrike" cap="none" normalizeH="0" baseline="0" dirty="0">
+                <a:ln>
+                  <a:noFill/>
+                </a:ln>
+                <a:solidFill>
+                  <a:srgbClr val="CC7832"/>
+                </a:solidFill>
+                <a:effectLst/>
+                <a:latin typeface="JetBrains Mono"/>
+              </a:rPr>
+            </a:br>
+            <a:r>
+              <a:rPr kumimoji="0" lang="de-DE" altLang="de-DE" b="0" i="0" u="none" strike="noStrike" cap="none" normalizeH="0" baseline="0" dirty="0">
+                <a:ln>
+                  <a:noFill/>
+                </a:ln>
+                <a:solidFill>
+                  <a:srgbClr val="CC7832"/>
+                </a:solidFill>
+                <a:effectLst/>
+                <a:latin typeface="JetBrains Mono"/>
+              </a:rPr>
+              <a:t>            </a:t>
+            </a:r>
+            <a:r>
+              <a:rPr kumimoji="0" lang="de-DE" altLang="de-DE" b="0" i="0" u="none" strike="noStrike" cap="none" normalizeH="0" baseline="0" dirty="0">
+                <a:ln>
+                  <a:noFill/>
+                </a:ln>
+                <a:solidFill>
+                  <a:srgbClr val="A9B7C6"/>
+                </a:solidFill>
+                <a:effectLst/>
+                <a:latin typeface="JetBrains Mono"/>
+              </a:rPr>
+              <a:t>{</a:t>
+            </a:r>
+            <a:r>
+              <a:rPr kumimoji="0" lang="de-DE" altLang="de-DE" b="0" i="0" u="none" strike="noStrike" cap="none" normalizeH="0" baseline="0" dirty="0">
+                <a:ln>
+                  <a:noFill/>
+                </a:ln>
+                <a:solidFill>
+                  <a:srgbClr val="9876AA"/>
+                </a:solidFill>
+                <a:effectLst/>
+                <a:latin typeface="JetBrains Mono"/>
+              </a:rPr>
+              <a:t>id</a:t>
+            </a:r>
+            <a:r>
+              <a:rPr kumimoji="0" lang="de-DE" altLang="de-DE" b="0" i="0" u="none" strike="noStrike" cap="none" normalizeH="0" baseline="0" dirty="0">
+                <a:ln>
+                  <a:noFill/>
+                </a:ln>
+                <a:solidFill>
+                  <a:srgbClr val="A9B7C6"/>
+                </a:solidFill>
+                <a:effectLst/>
+                <a:latin typeface="JetBrains Mono"/>
+              </a:rPr>
+              <a:t>:</a:t>
+            </a:r>
+            <a:r>
+              <a:rPr kumimoji="0" lang="de-DE" altLang="de-DE" b="0" i="0" u="none" strike="noStrike" cap="none" normalizeH="0" baseline="0" dirty="0">
+                <a:ln>
+                  <a:noFill/>
+                </a:ln>
+                <a:solidFill>
+                  <a:srgbClr val="6897BB"/>
+                </a:solidFill>
+                <a:effectLst/>
+                <a:latin typeface="JetBrains Mono"/>
+              </a:rPr>
+              <a:t>2</a:t>
+            </a:r>
+            <a:r>
+              <a:rPr kumimoji="0" lang="de-DE" altLang="de-DE" b="0" i="0" u="none" strike="noStrike" cap="none" normalizeH="0" baseline="0" dirty="0">
+                <a:ln>
+                  <a:noFill/>
+                </a:ln>
+                <a:solidFill>
+                  <a:srgbClr val="CC7832"/>
+                </a:solidFill>
+                <a:effectLst/>
+                <a:latin typeface="JetBrains Mono"/>
+              </a:rPr>
+              <a:t>,</a:t>
+            </a:r>
+            <a:br>
+              <a:rPr kumimoji="0" lang="de-DE" altLang="de-DE" b="0" i="0" u="none" strike="noStrike" cap="none" normalizeH="0" baseline="0" dirty="0">
+                <a:ln>
+                  <a:noFill/>
+                </a:ln>
+                <a:solidFill>
+                  <a:srgbClr val="CC7832"/>
+                </a:solidFill>
+                <a:effectLst/>
+                <a:latin typeface="JetBrains Mono"/>
+              </a:rPr>
+            </a:br>
+            <a:r>
+              <a:rPr kumimoji="0" lang="de-DE" altLang="de-DE" b="0" i="0" u="none" strike="noStrike" cap="none" normalizeH="0" baseline="0" dirty="0">
+                <a:ln>
+                  <a:noFill/>
+                </a:ln>
+                <a:solidFill>
+                  <a:srgbClr val="CC7832"/>
+                </a:solidFill>
+                <a:effectLst/>
+                <a:latin typeface="JetBrains Mono"/>
+              </a:rPr>
+              <a:t>                </a:t>
+            </a:r>
+            <a:r>
+              <a:rPr kumimoji="0" lang="de-DE" altLang="de-DE" b="0" i="0" u="none" strike="noStrike" cap="none" normalizeH="0" baseline="0" dirty="0" err="1">
+                <a:ln>
+                  <a:noFill/>
+                </a:ln>
+                <a:solidFill>
+                  <a:srgbClr val="9876AA"/>
+                </a:solidFill>
+                <a:effectLst/>
+                <a:latin typeface="JetBrains Mono"/>
+              </a:rPr>
+              <a:t>question</a:t>
+            </a:r>
+            <a:r>
+              <a:rPr kumimoji="0" lang="de-DE" altLang="de-DE" b="0" i="0" u="none" strike="noStrike" cap="none" normalizeH="0" baseline="0" dirty="0">
+                <a:ln>
+                  <a:noFill/>
+                </a:ln>
+                <a:solidFill>
+                  <a:srgbClr val="A9B7C6"/>
+                </a:solidFill>
+                <a:effectLst/>
+                <a:latin typeface="JetBrains Mono"/>
+              </a:rPr>
+              <a:t>:</a:t>
+            </a:r>
+            <a:r>
+              <a:rPr kumimoji="0" lang="de-DE" altLang="de-DE" b="0" i="0" u="none" strike="noStrike" cap="none" normalizeH="0" baseline="0" dirty="0">
+                <a:ln>
+                  <a:noFill/>
+                </a:ln>
+                <a:solidFill>
+                  <a:srgbClr val="6A8759"/>
+                </a:solidFill>
+                <a:effectLst/>
+                <a:latin typeface="JetBrains Mono"/>
+              </a:rPr>
+              <a:t>"</a:t>
+            </a:r>
+            <a:r>
+              <a:rPr kumimoji="0" lang="de-DE" altLang="de-DE" b="0" i="0" u="none" strike="noStrike" cap="none" normalizeH="0" baseline="0" dirty="0" err="1">
+                <a:ln>
+                  <a:noFill/>
+                </a:ln>
+                <a:solidFill>
+                  <a:srgbClr val="6A8759"/>
+                </a:solidFill>
+                <a:effectLst/>
+                <a:latin typeface="JetBrains Mono"/>
+              </a:rPr>
+              <a:t>What</a:t>
+            </a:r>
+            <a:r>
+              <a:rPr kumimoji="0" lang="de-DE" altLang="de-DE" b="0" i="0" u="none" strike="noStrike" cap="none" normalizeH="0" baseline="0" dirty="0">
+                <a:ln>
+                  <a:noFill/>
+                </a:ln>
+                <a:solidFill>
+                  <a:srgbClr val="6A8759"/>
+                </a:solidFill>
+                <a:effectLst/>
+                <a:latin typeface="JetBrains Mono"/>
+              </a:rPr>
+              <a:t> </a:t>
+            </a:r>
+            <a:r>
+              <a:rPr kumimoji="0" lang="de-DE" altLang="de-DE" b="0" i="0" u="none" strike="noStrike" cap="none" normalizeH="0" baseline="0" dirty="0" err="1">
+                <a:ln>
+                  <a:noFill/>
+                </a:ln>
+                <a:solidFill>
+                  <a:srgbClr val="6A8759"/>
+                </a:solidFill>
+                <a:effectLst/>
+                <a:latin typeface="JetBrains Mono"/>
+              </a:rPr>
+              <a:t>is</a:t>
+            </a:r>
+            <a:r>
+              <a:rPr kumimoji="0" lang="de-DE" altLang="de-DE" b="0" i="0" u="none" strike="noStrike" cap="none" normalizeH="0" baseline="0" dirty="0">
+                <a:ln>
+                  <a:noFill/>
+                </a:ln>
+                <a:solidFill>
+                  <a:srgbClr val="6A8759"/>
+                </a:solidFill>
+                <a:effectLst/>
+                <a:latin typeface="JetBrains Mono"/>
+              </a:rPr>
+              <a:t> </a:t>
+            </a:r>
+            <a:r>
+              <a:rPr kumimoji="0" lang="de-DE" altLang="de-DE" b="0" i="0" u="none" strike="noStrike" cap="none" normalizeH="0" baseline="0" dirty="0" err="1">
+                <a:ln>
+                  <a:noFill/>
+                </a:ln>
+                <a:solidFill>
+                  <a:srgbClr val="6A8759"/>
+                </a:solidFill>
+                <a:effectLst/>
+                <a:latin typeface="JetBrains Mono"/>
+              </a:rPr>
+              <a:t>green</a:t>
+            </a:r>
+            <a:r>
+              <a:rPr kumimoji="0" lang="de-DE" altLang="de-DE" b="0" i="0" u="none" strike="noStrike" cap="none" normalizeH="0" baseline="0" dirty="0">
+                <a:ln>
+                  <a:noFill/>
+                </a:ln>
+                <a:solidFill>
+                  <a:srgbClr val="6A8759"/>
+                </a:solidFill>
+                <a:effectLst/>
+                <a:latin typeface="JetBrains Mono"/>
+              </a:rPr>
+              <a:t>?"</a:t>
+            </a:r>
+            <a:r>
+              <a:rPr kumimoji="0" lang="de-DE" altLang="de-DE" b="0" i="0" u="none" strike="noStrike" cap="none" normalizeH="0" baseline="0" dirty="0">
+                <a:ln>
+                  <a:noFill/>
+                </a:ln>
+                <a:solidFill>
+                  <a:srgbClr val="CC7832"/>
+                </a:solidFill>
+                <a:effectLst/>
+                <a:latin typeface="JetBrains Mono"/>
+              </a:rPr>
+              <a:t>,</a:t>
+            </a:r>
+            <a:br>
+              <a:rPr kumimoji="0" lang="de-DE" altLang="de-DE" b="0" i="0" u="none" strike="noStrike" cap="none" normalizeH="0" baseline="0" dirty="0">
+                <a:ln>
+                  <a:noFill/>
+                </a:ln>
+                <a:solidFill>
+                  <a:srgbClr val="CC7832"/>
+                </a:solidFill>
+                <a:effectLst/>
+                <a:latin typeface="JetBrains Mono"/>
+              </a:rPr>
+            </a:br>
+            <a:r>
+              <a:rPr kumimoji="0" lang="de-DE" altLang="de-DE" b="0" i="0" u="none" strike="noStrike" cap="none" normalizeH="0" baseline="0" dirty="0">
+                <a:ln>
+                  <a:noFill/>
+                </a:ln>
+                <a:solidFill>
+                  <a:srgbClr val="CC7832"/>
+                </a:solidFill>
+                <a:effectLst/>
+                <a:latin typeface="JetBrains Mono"/>
+              </a:rPr>
+              <a:t>                </a:t>
+            </a:r>
+            <a:r>
+              <a:rPr kumimoji="0" lang="de-DE" altLang="de-DE" b="0" i="0" u="none" strike="noStrike" cap="none" normalizeH="0" baseline="0" dirty="0" err="1">
+                <a:ln>
+                  <a:noFill/>
+                </a:ln>
+                <a:solidFill>
+                  <a:srgbClr val="9876AA"/>
+                </a:solidFill>
+                <a:effectLst/>
+                <a:latin typeface="JetBrains Mono"/>
+              </a:rPr>
+              <a:t>answer</a:t>
+            </a:r>
+            <a:r>
+              <a:rPr kumimoji="0" lang="de-DE" altLang="de-DE" b="0" i="0" u="none" strike="noStrike" cap="none" normalizeH="0" baseline="0" dirty="0">
+                <a:ln>
+                  <a:noFill/>
+                </a:ln>
+                <a:solidFill>
+                  <a:srgbClr val="A9B7C6"/>
+                </a:solidFill>
+                <a:effectLst/>
+                <a:latin typeface="JetBrains Mono"/>
+              </a:rPr>
+              <a:t>:</a:t>
+            </a:r>
+            <a:r>
+              <a:rPr kumimoji="0" lang="de-DE" altLang="de-DE" b="0" i="0" u="none" strike="noStrike" cap="none" normalizeH="0" baseline="0" dirty="0">
+                <a:ln>
+                  <a:noFill/>
+                </a:ln>
+                <a:solidFill>
+                  <a:srgbClr val="6A8759"/>
+                </a:solidFill>
+                <a:effectLst/>
+                <a:latin typeface="JetBrains Mono"/>
+              </a:rPr>
+              <a:t>"Gras </a:t>
+            </a:r>
+            <a:r>
+              <a:rPr kumimoji="0" lang="de-DE" altLang="de-DE" b="0" i="0" u="none" strike="noStrike" cap="none" normalizeH="0" baseline="0" dirty="0" err="1">
+                <a:ln>
+                  <a:noFill/>
+                </a:ln>
+                <a:solidFill>
+                  <a:srgbClr val="6A8759"/>
+                </a:solidFill>
+                <a:effectLst/>
+                <a:latin typeface="JetBrains Mono"/>
+              </a:rPr>
+              <a:t>is</a:t>
+            </a:r>
+            <a:r>
+              <a:rPr kumimoji="0" lang="de-DE" altLang="de-DE" b="0" i="0" u="none" strike="noStrike" cap="none" normalizeH="0" baseline="0" dirty="0">
+                <a:ln>
+                  <a:noFill/>
+                </a:ln>
+                <a:solidFill>
+                  <a:srgbClr val="6A8759"/>
+                </a:solidFill>
+                <a:effectLst/>
+                <a:latin typeface="JetBrains Mono"/>
+              </a:rPr>
+              <a:t> </a:t>
+            </a:r>
+            <a:r>
+              <a:rPr kumimoji="0" lang="de-DE" altLang="de-DE" b="0" i="0" u="none" strike="noStrike" cap="none" normalizeH="0" baseline="0" dirty="0" err="1">
+                <a:ln>
+                  <a:noFill/>
+                </a:ln>
+                <a:solidFill>
+                  <a:srgbClr val="6A8759"/>
+                </a:solidFill>
+                <a:effectLst/>
+                <a:latin typeface="JetBrains Mono"/>
+              </a:rPr>
+              <a:t>green</a:t>
+            </a:r>
+            <a:r>
+              <a:rPr kumimoji="0" lang="de-DE" altLang="de-DE" b="0" i="0" u="none" strike="noStrike" cap="none" normalizeH="0" baseline="0" dirty="0">
+                <a:ln>
+                  <a:noFill/>
+                </a:ln>
+                <a:solidFill>
+                  <a:srgbClr val="6A8759"/>
+                </a:solidFill>
+                <a:effectLst/>
+                <a:latin typeface="JetBrains Mono"/>
+              </a:rPr>
+              <a:t>"</a:t>
+            </a:r>
+            <a:r>
+              <a:rPr kumimoji="0" lang="de-DE" altLang="de-DE" b="0" i="0" u="none" strike="noStrike" cap="none" normalizeH="0" baseline="0" dirty="0">
+                <a:ln>
+                  <a:noFill/>
+                </a:ln>
+                <a:solidFill>
+                  <a:srgbClr val="A9B7C6"/>
+                </a:solidFill>
+                <a:effectLst/>
+                <a:latin typeface="JetBrains Mono"/>
+              </a:rPr>
+              <a:t>}</a:t>
+            </a:r>
+            <a:br>
+              <a:rPr kumimoji="0" lang="de-DE" altLang="de-DE" b="0" i="0" u="none" strike="noStrike" cap="none" normalizeH="0" baseline="0" dirty="0">
+                <a:ln>
+                  <a:noFill/>
+                </a:ln>
+                <a:solidFill>
+                  <a:srgbClr val="A9B7C6"/>
+                </a:solidFill>
+                <a:effectLst/>
+                <a:latin typeface="JetBrains Mono"/>
+              </a:rPr>
+            </a:br>
+            <a:r>
+              <a:rPr kumimoji="0" lang="de-DE" altLang="de-DE" b="0" i="0" u="none" strike="noStrike" cap="none" normalizeH="0" baseline="0" dirty="0">
+                <a:ln>
+                  <a:noFill/>
+                </a:ln>
+                <a:solidFill>
+                  <a:srgbClr val="A9B7C6"/>
+                </a:solidFill>
+                <a:effectLst/>
+                <a:latin typeface="JetBrains Mono"/>
+              </a:rPr>
+              <a:t>        ]</a:t>
+            </a:r>
+            <a:br>
+              <a:rPr kumimoji="0" lang="de-DE" altLang="de-DE" b="0" i="0" u="none" strike="noStrike" cap="none" normalizeH="0" baseline="0" dirty="0">
+                <a:ln>
+                  <a:noFill/>
+                </a:ln>
+                <a:solidFill>
+                  <a:srgbClr val="A9B7C6"/>
+                </a:solidFill>
+                <a:effectLst/>
+                <a:latin typeface="JetBrains Mono"/>
+              </a:rPr>
+            </a:br>
+            <a:r>
+              <a:rPr kumimoji="0" lang="de-DE" altLang="de-DE" b="0" i="0" u="none" strike="noStrike" cap="none" normalizeH="0" baseline="0" dirty="0">
+                <a:ln>
+                  <a:noFill/>
+                </a:ln>
+                <a:solidFill>
+                  <a:srgbClr val="A9B7C6"/>
+                </a:solidFill>
+                <a:effectLst/>
+                <a:latin typeface="JetBrains Mono"/>
+              </a:rPr>
+              <a:t>    }</a:t>
+            </a:r>
+            <a:r>
+              <a:rPr kumimoji="0" lang="de-DE" altLang="de-DE" b="0" i="0" u="none" strike="noStrike" cap="none" normalizeH="0" baseline="0" dirty="0">
+                <a:ln>
+                  <a:noFill/>
+                </a:ln>
+                <a:solidFill>
+                  <a:srgbClr val="CC7832"/>
+                </a:solidFill>
+                <a:effectLst/>
+                <a:latin typeface="JetBrains Mono"/>
+              </a:rPr>
+              <a:t>,</a:t>
+            </a:r>
+            <a:br>
+              <a:rPr kumimoji="0" lang="de-DE" altLang="de-DE" b="0" i="0" u="none" strike="noStrike" cap="none" normalizeH="0" baseline="0" dirty="0">
+                <a:ln>
+                  <a:noFill/>
+                </a:ln>
+                <a:solidFill>
+                  <a:srgbClr val="CC7832"/>
+                </a:solidFill>
+                <a:effectLst/>
+                <a:latin typeface="JetBrains Mono"/>
+              </a:rPr>
+            </a:br>
+            <a:r>
+              <a:rPr kumimoji="0" lang="de-DE" altLang="de-DE" b="0" i="0" u="none" strike="noStrike" cap="none" normalizeH="0" baseline="0" dirty="0">
+                <a:ln>
+                  <a:noFill/>
+                </a:ln>
+                <a:solidFill>
+                  <a:srgbClr val="CC7832"/>
+                </a:solidFill>
+                <a:effectLst/>
+                <a:latin typeface="JetBrains Mono"/>
+              </a:rPr>
+              <a:t>    </a:t>
+            </a:r>
+            <a:r>
+              <a:rPr kumimoji="0" lang="de-DE" altLang="de-DE" b="0" i="0" u="none" strike="noStrike" cap="none" normalizeH="0" baseline="0" dirty="0">
+                <a:ln>
+                  <a:noFill/>
+                </a:ln>
+                <a:solidFill>
+                  <a:srgbClr val="9876AA"/>
+                </a:solidFill>
+                <a:effectLst/>
+                <a:latin typeface="JetBrains Mono"/>
+              </a:rPr>
+              <a:t>currentCard</a:t>
+            </a:r>
+            <a:r>
+              <a:rPr kumimoji="0" lang="de-DE" altLang="de-DE" b="0" i="0" u="none" strike="noStrike" cap="none" normalizeH="0" baseline="0" dirty="0">
+                <a:ln>
+                  <a:noFill/>
+                </a:ln>
+                <a:solidFill>
+                  <a:srgbClr val="A9B7C6"/>
+                </a:solidFill>
+                <a:effectLst/>
+                <a:latin typeface="JetBrains Mono"/>
+              </a:rPr>
+              <a:t>:</a:t>
+            </a:r>
+            <a:r>
+              <a:rPr kumimoji="0" lang="de-DE" altLang="de-DE" b="0" i="0" u="none" strike="noStrike" cap="none" normalizeH="0" baseline="0" dirty="0">
+                <a:ln>
+                  <a:noFill/>
+                </a:ln>
+                <a:solidFill>
+                  <a:srgbClr val="6897BB"/>
+                </a:solidFill>
+                <a:effectLst/>
+                <a:latin typeface="JetBrains Mono"/>
+              </a:rPr>
+              <a:t>1</a:t>
+            </a:r>
+            <a:r>
+              <a:rPr kumimoji="0" lang="de-DE" altLang="de-DE" b="0" i="0" u="none" strike="noStrike" cap="none" normalizeH="0" baseline="0" dirty="0">
+                <a:ln>
+                  <a:noFill/>
+                </a:ln>
+                <a:solidFill>
+                  <a:srgbClr val="CC7832"/>
+                </a:solidFill>
+                <a:effectLst/>
+                <a:latin typeface="JetBrains Mono"/>
+              </a:rPr>
+              <a:t>,</a:t>
+            </a:r>
+            <a:br>
+              <a:rPr kumimoji="0" lang="de-DE" altLang="de-DE" b="0" i="0" u="none" strike="noStrike" cap="none" normalizeH="0" baseline="0" dirty="0">
+                <a:ln>
+                  <a:noFill/>
+                </a:ln>
+                <a:solidFill>
+                  <a:srgbClr val="CC7832"/>
+                </a:solidFill>
+                <a:effectLst/>
+                <a:latin typeface="JetBrains Mono"/>
+              </a:rPr>
+            </a:br>
+            <a:r>
+              <a:rPr kumimoji="0" lang="de-DE" altLang="de-DE" b="0" i="0" u="none" strike="noStrike" cap="none" normalizeH="0" baseline="0" dirty="0">
+                <a:ln>
+                  <a:noFill/>
+                </a:ln>
+                <a:solidFill>
+                  <a:srgbClr val="CC7832"/>
+                </a:solidFill>
+                <a:effectLst/>
+                <a:latin typeface="JetBrains Mono"/>
+              </a:rPr>
+              <a:t>    </a:t>
+            </a:r>
+            <a:r>
+              <a:rPr kumimoji="0" lang="de-DE" altLang="de-DE" b="0" i="0" u="none" strike="noStrike" cap="none" normalizeH="0" baseline="0" dirty="0">
+                <a:ln>
+                  <a:noFill/>
+                </a:ln>
+                <a:solidFill>
+                  <a:srgbClr val="9876AA"/>
+                </a:solidFill>
+                <a:effectLst/>
+                <a:latin typeface="JetBrains Mono"/>
+              </a:rPr>
+              <a:t>score</a:t>
+            </a:r>
+            <a:r>
+              <a:rPr kumimoji="0" lang="de-DE" altLang="de-DE" b="0" i="0" u="none" strike="noStrike" cap="none" normalizeH="0" baseline="0" dirty="0">
+                <a:ln>
+                  <a:noFill/>
+                </a:ln>
+                <a:solidFill>
+                  <a:srgbClr val="A9B7C6"/>
+                </a:solidFill>
+                <a:effectLst/>
+                <a:latin typeface="JetBrains Mono"/>
+              </a:rPr>
+              <a:t>:</a:t>
+            </a:r>
+            <a:r>
+              <a:rPr kumimoji="0" lang="de-DE" altLang="de-DE" b="0" i="0" u="none" strike="noStrike" cap="none" normalizeH="0" baseline="0" dirty="0">
+                <a:ln>
+                  <a:noFill/>
+                </a:ln>
+                <a:solidFill>
+                  <a:srgbClr val="6897BB"/>
+                </a:solidFill>
+                <a:effectLst/>
+                <a:latin typeface="JetBrains Mono"/>
+              </a:rPr>
+              <a:t>1</a:t>
+            </a:r>
+            <a:br>
+              <a:rPr kumimoji="0" lang="de-DE" altLang="de-DE" b="0" i="0" u="none" strike="noStrike" cap="none" normalizeH="0" baseline="0" dirty="0">
+                <a:ln>
+                  <a:noFill/>
+                </a:ln>
+                <a:solidFill>
+                  <a:srgbClr val="6897BB"/>
+                </a:solidFill>
+                <a:effectLst/>
+                <a:latin typeface="JetBrains Mono"/>
+              </a:rPr>
+            </a:br>
+            <a:r>
+              <a:rPr kumimoji="0" lang="de-DE" altLang="de-DE" b="0" i="0" u="none" strike="noStrike" cap="none" normalizeH="0" baseline="0" dirty="0">
+                <a:ln>
+                  <a:noFill/>
+                </a:ln>
+                <a:solidFill>
+                  <a:srgbClr val="A9B7C6"/>
+                </a:solidFill>
+                <a:effectLst/>
+                <a:latin typeface="JetBrains Mono"/>
+              </a:rPr>
+              <a:t>}</a:t>
+            </a:r>
+            <a:endParaRPr kumimoji="0" lang="de-DE" altLang="de-DE" sz="4000" b="0" i="0" u="none" strike="noStrike" cap="none" normalizeH="0" baseline="0" dirty="0">
+              <a:ln>
+                <a:noFill/>
+              </a:ln>
+              <a:solidFill>
+                <a:schemeClr val="tx1"/>
+              </a:solidFill>
+              <a:effectLst/>
+              <a:latin typeface="Arial" panose="020B0604020202020204" pitchFamily="34" charset="0"/>
+            </a:endParaRPr>
+          </a:p>
+        </p:txBody>
+      </p:sp>
+    </p:spTree>
+    <p:extLst>
+      <p:ext uri="{BB962C8B-B14F-4D97-AF65-F5344CB8AC3E}">
+        <p14:creationId xmlns:p14="http://schemas.microsoft.com/office/powerpoint/2010/main" val="3125170195"/>
+      </p:ext>
+    </p:extLst>
+  </p:cSld>
+  <p:clrMapOvr>
+    <a:masterClrMapping/>
+  </p:clrMapOvr>
+</p:sld>
+</file>
+
+<file path=ppt/slides/slide9.xml><?xml version="1.0" encoding="utf-8"?>
+<p:sld xmlns:a="http://schemas.openxmlformats.org/drawingml/2006/main" xmlns:r="http://schemas.openxmlformats.org/officeDocument/2006/relationships" xmlns:p="http://schemas.openxmlformats.org/presentationml/2006/main">
+  <p:cSld>
+    <p:spTree>
+      <p:nvGrpSpPr>
+        <p:cNvPr id="1" name=""/>
+        <p:cNvGrpSpPr/>
+        <p:nvPr/>
+      </p:nvGrpSpPr>
+      <p:grpSpPr>
+        <a:xfrm>
+          <a:off x="0" y="0"/>
+          <a:ext cx="0" cy="0"/>
+          <a:chOff x="0" y="0"/>
+          <a:chExt cx="0" cy="0"/>
+        </a:xfrm>
+      </p:grpSpPr>
       <p:graphicFrame>
         <p:nvGraphicFramePr>
           <p:cNvPr id="45" name="Tabelle 37">
@@ -20349,782 +22343,6 @@
     <p:extLst>
       <p:ext uri="{BB962C8B-B14F-4D97-AF65-F5344CB8AC3E}">
         <p14:creationId xmlns:p14="http://schemas.microsoft.com/office/powerpoint/2010/main" val="3368373615"/>
-      </p:ext>
-    </p:extLst>
-  </p:cSld>
-  <p:clrMapOvr>
-    <a:masterClrMapping/>
-  </p:clrMapOvr>
-</p:sld>
-</file>
-
-<file path=ppt/slides/slide9.xml><?xml version="1.0" encoding="utf-8"?>
-<p:sld xmlns:a="http://schemas.openxmlformats.org/drawingml/2006/main" xmlns:r="http://schemas.openxmlformats.org/officeDocument/2006/relationships" xmlns:p="http://schemas.openxmlformats.org/presentationml/2006/main">
-  <p:cSld>
-    <p:spTree>
-      <p:nvGrpSpPr>
-        <p:cNvPr id="1" name=""/>
-        <p:cNvGrpSpPr/>
-        <p:nvPr/>
-      </p:nvGrpSpPr>
-      <p:grpSpPr>
-        <a:xfrm>
-          <a:off x="0" y="0"/>
-          <a:ext cx="0" cy="0"/>
-          <a:chOff x="0" y="0"/>
-          <a:chExt cx="0" cy="0"/>
-        </a:xfrm>
-      </p:grpSpPr>
-      <p:graphicFrame>
-        <p:nvGraphicFramePr>
-          <p:cNvPr id="45" name="Tabelle 37">
-            <a:extLst>
-              <a:ext uri="{FF2B5EF4-FFF2-40B4-BE49-F238E27FC236}">
-                <a16:creationId xmlns:a16="http://schemas.microsoft.com/office/drawing/2014/main" id="{5BBFA1E0-2CDB-4D7C-811D-141100FAB4F3}"/>
-              </a:ext>
-            </a:extLst>
-          </p:cNvPr>
-          <p:cNvGraphicFramePr>
-            <a:graphicFrameLocks noGrp="1"/>
-          </p:cNvGraphicFramePr>
-          <p:nvPr/>
-        </p:nvGraphicFramePr>
-        <p:xfrm>
-          <a:off x="423317" y="7133493"/>
-          <a:ext cx="4701228" cy="370840"/>
-        </p:xfrm>
-        <a:graphic>
-          <a:graphicData uri="http://schemas.openxmlformats.org/drawingml/2006/table">
-            <a:tbl>
-              <a:tblPr firstRow="1" bandRow="1">
-                <a:tableStyleId>{5C22544A-7EE6-4342-B048-85BDC9FD1C3A}</a:tableStyleId>
-              </a:tblPr>
-              <a:tblGrid>
-                <a:gridCol w="2350614">
-                  <a:extLst>
-                    <a:ext uri="{9D8B030D-6E8A-4147-A177-3AD203B41FA5}">
-                      <a16:colId xmlns:a16="http://schemas.microsoft.com/office/drawing/2014/main" val="3700248952"/>
-                    </a:ext>
-                  </a:extLst>
-                </a:gridCol>
-                <a:gridCol w="2350614">
-                  <a:extLst>
-                    <a:ext uri="{9D8B030D-6E8A-4147-A177-3AD203B41FA5}">
-                      <a16:colId xmlns:a16="http://schemas.microsoft.com/office/drawing/2014/main" val="253239616"/>
-                    </a:ext>
-                  </a:extLst>
-                </a:gridCol>
-              </a:tblGrid>
-              <a:tr h="370840">
-                <a:tc>
-                  <a:txBody>
-                    <a:bodyPr/>
-                    <a:lstStyle/>
-                    <a:p>
-                      <a:pPr algn="ctr"/>
-                      <a:r>
-                        <a:rPr lang="en-US" sz="1800" b="0" i="0" u="none" strike="noStrike" kern="1200" cap="none" dirty="0">
-                          <a:ln>
-                            <a:noFill/>
-                          </a:ln>
-                          <a:solidFill>
-                            <a:srgbClr val="FFFFFF"/>
-                          </a:solidFill>
-                          <a:latin typeface="Pothana2000" pitchFamily="18"/>
-                          <a:ea typeface="DejaVu Sans" pitchFamily="2"/>
-                          <a:cs typeface="DejaVu Sans" pitchFamily="2"/>
-                        </a:rPr>
-                        <a:t>Home</a:t>
-                      </a:r>
-                      <a:endParaRPr lang="en-AU" dirty="0"/>
-                    </a:p>
-                  </a:txBody>
-                  <a:tcPr>
-                    <a:lnL w="12700" cmpd="sng">
-                      <a:noFill/>
-                    </a:lnL>
-                    <a:lnR w="12700" cmpd="sng">
-                      <a:noFill/>
-                    </a:lnR>
-                    <a:lnT w="12700" cmpd="sng">
-                      <a:noFill/>
-                    </a:lnT>
-                    <a:lnB w="38100" cmpd="sng">
-                      <a:noFill/>
-                    </a:lnB>
-                    <a:lnTlToBr w="12700" cmpd="sng">
-                      <a:noFill/>
-                      <a:prstDash val="solid"/>
-                    </a:lnTlToBr>
-                    <a:lnBlToTr w="12700" cmpd="sng">
-                      <a:noFill/>
-                      <a:prstDash val="solid"/>
-                    </a:lnBlToTr>
-                    <a:solidFill>
-                      <a:srgbClr val="28AFB0"/>
-                    </a:solidFill>
-                  </a:tcPr>
-                </a:tc>
-                <a:tc>
-                  <a:txBody>
-                    <a:bodyPr/>
-                    <a:lstStyle/>
-                    <a:p>
-                      <a:pPr algn="ctr"/>
-                      <a:r>
-                        <a:rPr lang="en-US" sz="1800" b="0" i="0" u="none" strike="noStrike" kern="1200" cap="none" dirty="0">
-                          <a:ln>
-                            <a:noFill/>
-                          </a:ln>
-                          <a:solidFill>
-                            <a:srgbClr val="FFFFFF"/>
-                          </a:solidFill>
-                          <a:latin typeface="Pothana2000" pitchFamily="18"/>
-                          <a:ea typeface="DejaVu Sans" pitchFamily="2"/>
-                          <a:cs typeface="DejaVu Sans" pitchFamily="2"/>
-                        </a:rPr>
-                        <a:t>Add</a:t>
-                      </a:r>
-                      <a:endParaRPr lang="en-AU" dirty="0"/>
-                    </a:p>
-                  </a:txBody>
-                  <a:tcPr>
-                    <a:lnL w="12700" cmpd="sng">
-                      <a:noFill/>
-                    </a:lnL>
-                    <a:lnR w="12700" cmpd="sng">
-                      <a:noFill/>
-                    </a:lnR>
-                    <a:lnT w="12700" cmpd="sng">
-                      <a:noFill/>
-                    </a:lnT>
-                    <a:lnB w="38100" cmpd="sng">
-                      <a:noFill/>
-                    </a:lnB>
-                    <a:lnTlToBr w="12700" cmpd="sng">
-                      <a:noFill/>
-                      <a:prstDash val="solid"/>
-                    </a:lnTlToBr>
-                    <a:lnBlToTr w="12700" cmpd="sng">
-                      <a:noFill/>
-                      <a:prstDash val="solid"/>
-                    </a:lnBlToTr>
-                    <a:solidFill>
-                      <a:srgbClr val="19647E"/>
-                    </a:solidFill>
-                  </a:tcPr>
-                </a:tc>
-                <a:extLst>
-                  <a:ext uri="{0D108BD9-81ED-4DB2-BD59-A6C34878D82A}">
-                    <a16:rowId xmlns:a16="http://schemas.microsoft.com/office/drawing/2014/main" val="2349748964"/>
-                  </a:ext>
-                </a:extLst>
-              </a:tr>
-            </a:tbl>
-          </a:graphicData>
-        </a:graphic>
-      </p:graphicFrame>
-      <p:sp>
-        <p:nvSpPr>
-          <p:cNvPr id="62" name="Titel 3">
-            <a:extLst>
-              <a:ext uri="{FF2B5EF4-FFF2-40B4-BE49-F238E27FC236}">
-                <a16:creationId xmlns:a16="http://schemas.microsoft.com/office/drawing/2014/main" id="{2BB35323-D530-4ECE-85F3-7C8EAC39654F}"/>
-              </a:ext>
-            </a:extLst>
-          </p:cNvPr>
-          <p:cNvSpPr txBox="1">
-            <a:spLocks/>
-          </p:cNvSpPr>
-          <p:nvPr/>
-        </p:nvSpPr>
-        <p:spPr>
-          <a:xfrm>
-            <a:off x="503999" y="301320"/>
-            <a:ext cx="8208000" cy="745200"/>
-          </a:xfrm>
-          <a:prstGeom prst="rect">
-            <a:avLst/>
-          </a:prstGeom>
-        </p:spPr>
-        <p:txBody>
-          <a:bodyPr/>
-          <a:lstStyle>
-            <a:lvl1pPr lvl="0" algn="ctr" hangingPunct="0">
-              <a:buNone/>
-              <a:tabLst/>
-              <a:defRPr lang="en-US" sz="3600" b="0" i="0" u="none" strike="noStrike" kern="1200" cap="none">
-                <a:ln>
-                  <a:noFill/>
-                </a:ln>
-                <a:solidFill>
-                  <a:schemeClr val="bg1"/>
-                </a:solidFill>
-                <a:highlight>
-                  <a:scrgbClr r="0" g="0" b="0">
-                    <a:alpha val="0"/>
-                  </a:scrgbClr>
-                </a:highlight>
-                <a:latin typeface="Liberation Sans" pitchFamily="18"/>
-                <a:ea typeface="DejaVu Sans" pitchFamily="2"/>
-                <a:cs typeface="DejaVu Sans" pitchFamily="2"/>
-              </a:defRPr>
-            </a:lvl1pPr>
-          </a:lstStyle>
-          <a:p>
-            <a:r>
-              <a:rPr lang="en-US" dirty="0"/>
-              <a:t>Deck List View</a:t>
-            </a:r>
-            <a:endParaRPr lang="en-AU" dirty="0"/>
-          </a:p>
-        </p:txBody>
-      </p:sp>
-      <p:grpSp>
-        <p:nvGrpSpPr>
-          <p:cNvPr id="3" name="Gruppieren 2">
-            <a:extLst>
-              <a:ext uri="{FF2B5EF4-FFF2-40B4-BE49-F238E27FC236}">
-                <a16:creationId xmlns:a16="http://schemas.microsoft.com/office/drawing/2014/main" id="{BF026169-1E9F-41AD-AC0F-A2DD3011A3A9}"/>
-              </a:ext>
-            </a:extLst>
-          </p:cNvPr>
-          <p:cNvGrpSpPr/>
-          <p:nvPr/>
-        </p:nvGrpSpPr>
-        <p:grpSpPr>
-          <a:xfrm>
-            <a:off x="423318" y="1605452"/>
-            <a:ext cx="4704355" cy="5891009"/>
-            <a:chOff x="1864768" y="1765763"/>
-            <a:chExt cx="4704355" cy="5891009"/>
-          </a:xfrm>
-        </p:grpSpPr>
-        <p:grpSp>
-          <p:nvGrpSpPr>
-            <p:cNvPr id="5" name="Gruppieren 4">
-              <a:extLst>
-                <a:ext uri="{FF2B5EF4-FFF2-40B4-BE49-F238E27FC236}">
-                  <a16:creationId xmlns:a16="http://schemas.microsoft.com/office/drawing/2014/main" id="{E27F5A0A-732F-45CA-9888-1A94E6572BDB}"/>
-                </a:ext>
-              </a:extLst>
-            </p:cNvPr>
-            <p:cNvGrpSpPr/>
-            <p:nvPr/>
-          </p:nvGrpSpPr>
-          <p:grpSpPr>
-            <a:xfrm>
-              <a:off x="1864768" y="1765763"/>
-              <a:ext cx="4704355" cy="5891009"/>
-              <a:chOff x="1658345" y="1738516"/>
-              <a:chExt cx="5980706" cy="5891009"/>
-            </a:xfrm>
-          </p:grpSpPr>
-          <p:sp>
-            <p:nvSpPr>
-              <p:cNvPr id="44" name="Rechteck 43">
-                <a:extLst>
-                  <a:ext uri="{FF2B5EF4-FFF2-40B4-BE49-F238E27FC236}">
-                    <a16:creationId xmlns:a16="http://schemas.microsoft.com/office/drawing/2014/main" id="{81AB474E-AF56-4283-AFF7-9AE8545752A7}"/>
-                  </a:ext>
-                </a:extLst>
-              </p:cNvPr>
-              <p:cNvSpPr/>
-              <p:nvPr/>
-            </p:nvSpPr>
-            <p:spPr>
-              <a:xfrm>
-                <a:off x="1662321" y="1746388"/>
-                <a:ext cx="5976730" cy="5883137"/>
-              </a:xfrm>
-              <a:prstGeom prst="rect">
-                <a:avLst/>
-              </a:prstGeom>
-              <a:noFill/>
-            </p:spPr>
-            <p:style>
-              <a:lnRef idx="2">
-                <a:schemeClr val="accent1">
-                  <a:shade val="50000"/>
-                </a:schemeClr>
-              </a:lnRef>
-              <a:fillRef idx="1">
-                <a:schemeClr val="accent1"/>
-              </a:fillRef>
-              <a:effectRef idx="0">
-                <a:schemeClr val="accent1"/>
-              </a:effectRef>
-              <a:fontRef idx="minor">
-                <a:schemeClr val="lt1"/>
-              </a:fontRef>
-            </p:style>
-            <p:txBody>
-              <a:bodyPr rtlCol="0" anchor="ctr"/>
-              <a:lstStyle/>
-              <a:p>
-                <a:pPr algn="ctr"/>
-                <a:endParaRPr lang="en-AU"/>
-              </a:p>
-            </p:txBody>
-          </p:sp>
-          <p:grpSp>
-            <p:nvGrpSpPr>
-              <p:cNvPr id="2" name="Gruppieren 1">
-                <a:extLst>
-                  <a:ext uri="{FF2B5EF4-FFF2-40B4-BE49-F238E27FC236}">
-                    <a16:creationId xmlns:a16="http://schemas.microsoft.com/office/drawing/2014/main" id="{1FDC0EFF-D425-4288-A130-602D18D3BEB7}"/>
-                  </a:ext>
-                </a:extLst>
-              </p:cNvPr>
-              <p:cNvGrpSpPr/>
-              <p:nvPr/>
-            </p:nvGrpSpPr>
-            <p:grpSpPr>
-              <a:xfrm>
-                <a:off x="1658345" y="1738516"/>
-                <a:ext cx="5976730" cy="2292393"/>
-                <a:chOff x="1658345" y="1738516"/>
-                <a:chExt cx="5976730" cy="2292393"/>
-              </a:xfrm>
-            </p:grpSpPr>
-            <p:grpSp>
-              <p:nvGrpSpPr>
-                <p:cNvPr id="31" name="Gruppieren 30">
-                  <a:extLst>
-                    <a:ext uri="{FF2B5EF4-FFF2-40B4-BE49-F238E27FC236}">
-                      <a16:creationId xmlns:a16="http://schemas.microsoft.com/office/drawing/2014/main" id="{4F4DEF71-4875-4679-926E-F77DE6187059}"/>
-                    </a:ext>
-                  </a:extLst>
-                </p:cNvPr>
-                <p:cNvGrpSpPr/>
-                <p:nvPr/>
-              </p:nvGrpSpPr>
-              <p:grpSpPr>
-                <a:xfrm>
-                  <a:off x="1658345" y="1738516"/>
-                  <a:ext cx="5976730" cy="745200"/>
-                  <a:chOff x="274320" y="3749040"/>
-                  <a:chExt cx="8595360" cy="1554479"/>
-                </a:xfrm>
-              </p:grpSpPr>
-              <p:sp>
-                <p:nvSpPr>
-                  <p:cNvPr id="42" name="Freihandform: Form 41">
-                    <a:extLst>
-                      <a:ext uri="{FF2B5EF4-FFF2-40B4-BE49-F238E27FC236}">
-                        <a16:creationId xmlns:a16="http://schemas.microsoft.com/office/drawing/2014/main" id="{1EEBB0A9-F827-4341-8E50-7E149A39BC9A}"/>
-                      </a:ext>
-                    </a:extLst>
-                  </p:cNvPr>
-                  <p:cNvSpPr/>
-                  <p:nvPr/>
-                </p:nvSpPr>
-                <p:spPr>
-                  <a:xfrm>
-                    <a:off x="274320" y="3749040"/>
-                    <a:ext cx="8595360" cy="1554479"/>
-                  </a:xfrm>
-                  <a:custGeom>
-                    <a:avLst/>
-                    <a:gdLst>
-                      <a:gd name="f0" fmla="val 0"/>
-                      <a:gd name="f1" fmla="val 21600"/>
-                    </a:gdLst>
-                    <a:ahLst/>
-                    <a:cxnLst>
-                      <a:cxn ang="3cd4">
-                        <a:pos x="hc" y="t"/>
-                      </a:cxn>
-                      <a:cxn ang="0">
-                        <a:pos x="r" y="vc"/>
-                      </a:cxn>
-                      <a:cxn ang="cd4">
-                        <a:pos x="hc" y="b"/>
-                      </a:cxn>
-                      <a:cxn ang="cd2">
-                        <a:pos x="l" y="vc"/>
-                      </a:cxn>
-                    </a:cxnLst>
-                    <a:rect l="l" t="t" r="r" b="b"/>
-                    <a:pathLst>
-                      <a:path w="21600" h="21600">
-                        <a:moveTo>
-                          <a:pt x="f0" y="f0"/>
-                        </a:moveTo>
-                        <a:lnTo>
-                          <a:pt x="f1" y="f0"/>
-                        </a:lnTo>
-                        <a:lnTo>
-                          <a:pt x="f1" y="f1"/>
-                        </a:lnTo>
-                        <a:lnTo>
-                          <a:pt x="f0" y="f1"/>
-                        </a:lnTo>
-                        <a:lnTo>
-                          <a:pt x="f0" y="f0"/>
-                        </a:lnTo>
-                        <a:close/>
-                      </a:path>
-                    </a:pathLst>
-                  </a:custGeom>
-                  <a:solidFill>
-                    <a:srgbClr val="19647E"/>
-                  </a:solidFill>
-                  <a:ln w="0">
-                    <a:solidFill>
-                      <a:srgbClr val="3465A4"/>
-                    </a:solidFill>
-                    <a:prstDash val="solid"/>
-                    <a:bevel/>
-                  </a:ln>
-                </p:spPr>
-                <p:txBody>
-                  <a:bodyPr wrap="none" lIns="90000" tIns="45000" rIns="90000" bIns="45000" anchor="ctr" anchorCtr="0" compatLnSpc="0">
-                    <a:noAutofit/>
-                  </a:bodyPr>
-                  <a:lstStyle/>
-                  <a:p>
-                    <a:pPr marL="0" marR="0" lvl="0" indent="0" hangingPunct="0">
-                      <a:lnSpc>
-                        <a:spcPct val="100000"/>
-                      </a:lnSpc>
-                      <a:spcBef>
-                        <a:spcPts val="0"/>
-                      </a:spcBef>
-                      <a:spcAft>
-                        <a:spcPts val="0"/>
-                      </a:spcAft>
-                      <a:buNone/>
-                      <a:tabLst/>
-                    </a:pPr>
-                    <a:endParaRPr lang="en-US" sz="1800" b="0" i="0" u="none" strike="noStrike" kern="1200" cap="none" dirty="0">
-                      <a:ln>
-                        <a:noFill/>
-                      </a:ln>
-                      <a:latin typeface="Liberation Sans" pitchFamily="18"/>
-                      <a:ea typeface="DejaVu Sans" pitchFamily="2"/>
-                      <a:cs typeface="DejaVu Sans" pitchFamily="2"/>
-                    </a:endParaRPr>
-                  </a:p>
-                </p:txBody>
-              </p:sp>
-              <p:sp>
-                <p:nvSpPr>
-                  <p:cNvPr id="39" name="Textfeld 38">
-                    <a:extLst>
-                      <a:ext uri="{FF2B5EF4-FFF2-40B4-BE49-F238E27FC236}">
-                        <a16:creationId xmlns:a16="http://schemas.microsoft.com/office/drawing/2014/main" id="{302E0C61-CEF1-47A8-BFBF-C1380D62CBC4}"/>
-                      </a:ext>
-                    </a:extLst>
-                  </p:cNvPr>
-                  <p:cNvSpPr txBox="1"/>
-                  <p:nvPr/>
-                </p:nvSpPr>
-                <p:spPr>
-                  <a:xfrm>
-                    <a:off x="3739403" y="3909924"/>
-                    <a:ext cx="1946355" cy="676092"/>
-                  </a:xfrm>
-                  <a:prstGeom prst="rect">
-                    <a:avLst/>
-                  </a:prstGeom>
-                  <a:noFill/>
-                  <a:ln>
-                    <a:noFill/>
-                  </a:ln>
-                </p:spPr>
-                <p:txBody>
-                  <a:bodyPr wrap="none" lIns="90000" tIns="45000" rIns="90000" bIns="45000" anchorCtr="0" compatLnSpc="0">
-                    <a:spAutoFit/>
-                  </a:bodyPr>
-                  <a:lstStyle/>
-                  <a:p>
-                    <a:pPr marL="0" marR="0" lvl="0" indent="0" algn="ctr" hangingPunct="0">
-                      <a:lnSpc>
-                        <a:spcPct val="100000"/>
-                      </a:lnSpc>
-                      <a:spcBef>
-                        <a:spcPts val="0"/>
-                      </a:spcBef>
-                      <a:spcAft>
-                        <a:spcPts val="0"/>
-                      </a:spcAft>
-                      <a:buNone/>
-                      <a:tabLst/>
-                      <a:defRPr sz="2600" b="1">
-                        <a:solidFill>
-                          <a:srgbClr val="FFFFFF"/>
-                        </a:solidFill>
-                        <a:latin typeface="Helvetica" pitchFamily="32"/>
-                      </a:defRPr>
-                    </a:pPr>
-                    <a:r>
-                      <a:rPr lang="en-US" sz="2600" b="1" dirty="0">
-                        <a:solidFill>
-                          <a:srgbClr val="FFFFFF"/>
-                        </a:solidFill>
-                        <a:latin typeface="Helvetica" pitchFamily="34"/>
-                        <a:ea typeface="DejaVu Sans" pitchFamily="2"/>
-                        <a:cs typeface="DejaVu Sans" pitchFamily="2"/>
-                      </a:rPr>
-                      <a:t>Flashcards</a:t>
-                    </a:r>
-                    <a:endParaRPr lang="en-US" sz="2600" b="1" i="0" u="none" strike="noStrike" kern="1200" cap="none" dirty="0">
-                      <a:ln>
-                        <a:noFill/>
-                      </a:ln>
-                      <a:solidFill>
-                        <a:srgbClr val="FFFFFF"/>
-                      </a:solidFill>
-                      <a:latin typeface="Helvetica" pitchFamily="34"/>
-                      <a:ea typeface="DejaVu Sans" pitchFamily="2"/>
-                      <a:cs typeface="DejaVu Sans" pitchFamily="2"/>
-                    </a:endParaRPr>
-                  </a:p>
-                </p:txBody>
-              </p:sp>
-            </p:grpSp>
-            <p:grpSp>
-              <p:nvGrpSpPr>
-                <p:cNvPr id="13" name="Gruppieren 12">
-                  <a:extLst>
-                    <a:ext uri="{FF2B5EF4-FFF2-40B4-BE49-F238E27FC236}">
-                      <a16:creationId xmlns:a16="http://schemas.microsoft.com/office/drawing/2014/main" id="{99AD1545-B6AE-4E4F-97B5-F643491B020F}"/>
-                    </a:ext>
-                  </a:extLst>
-                </p:cNvPr>
-                <p:cNvGrpSpPr/>
-                <p:nvPr/>
-              </p:nvGrpSpPr>
-              <p:grpSpPr>
-                <a:xfrm>
-                  <a:off x="2129340" y="2832346"/>
-                  <a:ext cx="5110105" cy="1198563"/>
-                  <a:chOff x="2464089" y="3779837"/>
-                  <a:chExt cx="5110105" cy="1198563"/>
-                </a:xfrm>
-              </p:grpSpPr>
-              <p:sp>
-                <p:nvSpPr>
-                  <p:cNvPr id="89" name="Rechteck: abgerundete Ecken 88">
-                    <a:hlinkClick r:id="rId3" action="ppaction://hlinksldjump"/>
-                    <a:extLst>
-                      <a:ext uri="{FF2B5EF4-FFF2-40B4-BE49-F238E27FC236}">
-                        <a16:creationId xmlns:a16="http://schemas.microsoft.com/office/drawing/2014/main" id="{65B502A5-24BC-4B96-8B6C-D6AF3BEA8430}"/>
-                      </a:ext>
-                    </a:extLst>
-                  </p:cNvPr>
-                  <p:cNvSpPr/>
-                  <p:nvPr/>
-                </p:nvSpPr>
-                <p:spPr>
-                  <a:xfrm>
-                    <a:off x="2464089" y="3779837"/>
-                    <a:ext cx="5110105" cy="1198563"/>
-                  </a:xfrm>
-                  <a:prstGeom prst="roundRect">
-                    <a:avLst/>
-                  </a:prstGeom>
-                  <a:noFill/>
-                </p:spPr>
-                <p:style>
-                  <a:lnRef idx="2">
-                    <a:schemeClr val="accent1">
-                      <a:shade val="50000"/>
-                    </a:schemeClr>
-                  </a:lnRef>
-                  <a:fillRef idx="1">
-                    <a:schemeClr val="accent1"/>
-                  </a:fillRef>
-                  <a:effectRef idx="0">
-                    <a:schemeClr val="accent1"/>
-                  </a:effectRef>
-                  <a:fontRef idx="minor">
-                    <a:schemeClr val="lt1"/>
-                  </a:fontRef>
-                </p:style>
-                <p:txBody>
-                  <a:bodyPr rtlCol="0" anchor="ctr"/>
-                  <a:lstStyle/>
-                  <a:p>
-                    <a:pPr algn="ctr"/>
-                    <a:endParaRPr lang="en-AU" dirty="0"/>
-                  </a:p>
-                </p:txBody>
-              </p:sp>
-              <p:sp>
-                <p:nvSpPr>
-                  <p:cNvPr id="90" name="Textfeld 89">
-                    <a:extLst>
-                      <a:ext uri="{FF2B5EF4-FFF2-40B4-BE49-F238E27FC236}">
-                        <a16:creationId xmlns:a16="http://schemas.microsoft.com/office/drawing/2014/main" id="{D57C6199-4D54-415B-87B8-FC0C7107FA6B}"/>
-                      </a:ext>
-                    </a:extLst>
-                  </p:cNvPr>
-                  <p:cNvSpPr txBox="1"/>
-                  <p:nvPr/>
-                </p:nvSpPr>
-                <p:spPr>
-                  <a:xfrm>
-                    <a:off x="3045648" y="4025578"/>
-                    <a:ext cx="3871620" cy="474254"/>
-                  </a:xfrm>
-                  <a:prstGeom prst="rect">
-                    <a:avLst/>
-                  </a:prstGeom>
-                  <a:noFill/>
-                  <a:ln>
-                    <a:noFill/>
-                  </a:ln>
-                </p:spPr>
-                <p:txBody>
-                  <a:bodyPr wrap="square" lIns="90000" tIns="45000" rIns="90000" bIns="45000" anchorCtr="0" compatLnSpc="0">
-                    <a:spAutoFit/>
-                  </a:bodyPr>
-                  <a:lstStyle/>
-                  <a:p>
-                    <a:pPr lvl="0" algn="ctr" hangingPunct="0">
-                      <a:defRPr sz="2600" b="1">
-                        <a:solidFill>
-                          <a:srgbClr val="FFFFFF"/>
-                        </a:solidFill>
-                        <a:latin typeface="Helvetica" pitchFamily="32"/>
-                      </a:defRPr>
-                    </a:pPr>
-                    <a:r>
-                      <a:rPr lang="en-US" b="1" dirty="0">
-                        <a:solidFill>
-                          <a:srgbClr val="19647E"/>
-                        </a:solidFill>
-                        <a:latin typeface="Helvetica" pitchFamily="34"/>
-                        <a:ea typeface="DejaVu Sans" pitchFamily="2"/>
-                        <a:cs typeface="DejaVu Sans" pitchFamily="2"/>
-                      </a:rPr>
-                      <a:t>REACT Course</a:t>
-                    </a:r>
-                    <a:endParaRPr lang="en-US" sz="1600" b="1" dirty="0">
-                      <a:solidFill>
-                        <a:srgbClr val="19647E"/>
-                      </a:solidFill>
-                      <a:latin typeface="Helvetica" pitchFamily="34"/>
-                      <a:ea typeface="DejaVu Sans" pitchFamily="2"/>
-                      <a:cs typeface="DejaVu Sans" pitchFamily="2"/>
-                    </a:endParaRPr>
-                  </a:p>
-                </p:txBody>
-              </p:sp>
-            </p:grpSp>
-          </p:grpSp>
-        </p:grpSp>
-        <p:sp>
-          <p:nvSpPr>
-            <p:cNvPr id="46" name="Textfeld 45">
-              <a:extLst>
-                <a:ext uri="{FF2B5EF4-FFF2-40B4-BE49-F238E27FC236}">
-                  <a16:creationId xmlns:a16="http://schemas.microsoft.com/office/drawing/2014/main" id="{785E43FF-6DAC-462B-8FC6-7F746D7B4FF2}"/>
-                </a:ext>
-              </a:extLst>
-            </p:cNvPr>
-            <p:cNvSpPr txBox="1"/>
-            <p:nvPr/>
-          </p:nvSpPr>
-          <p:spPr>
-            <a:xfrm>
-              <a:off x="3056974" y="3487189"/>
-              <a:ext cx="2323068" cy="372687"/>
-            </a:xfrm>
-            <a:prstGeom prst="rect">
-              <a:avLst/>
-            </a:prstGeom>
-            <a:noFill/>
-            <a:ln>
-              <a:noFill/>
-            </a:ln>
-          </p:spPr>
-          <p:txBody>
-            <a:bodyPr wrap="square" lIns="90000" tIns="45000" rIns="90000" bIns="45000" anchorCtr="0" compatLnSpc="0">
-              <a:spAutoFit/>
-            </a:bodyPr>
-            <a:lstStyle/>
-            <a:p>
-              <a:pPr algn="ctr"/>
-              <a:r>
-                <a:rPr lang="en-AU" dirty="0">
-                  <a:solidFill>
-                    <a:schemeClr val="tx1">
-                      <a:lumMod val="65000"/>
-                      <a:lumOff val="35000"/>
-                    </a:schemeClr>
-                  </a:solidFill>
-                </a:rPr>
-                <a:t>30 cards</a:t>
-              </a:r>
-            </a:p>
-          </p:txBody>
-        </p:sp>
-      </p:grpSp>
-      <p:sp>
-        <p:nvSpPr>
-          <p:cNvPr id="4" name="Rechteck 3">
-            <a:extLst>
-              <a:ext uri="{FF2B5EF4-FFF2-40B4-BE49-F238E27FC236}">
-                <a16:creationId xmlns:a16="http://schemas.microsoft.com/office/drawing/2014/main" id="{668D71C2-E725-451A-B588-1413991730BD}"/>
-              </a:ext>
-            </a:extLst>
-          </p:cNvPr>
-          <p:cNvSpPr/>
-          <p:nvPr/>
-        </p:nvSpPr>
-        <p:spPr>
-          <a:xfrm>
-            <a:off x="5377652" y="2160673"/>
-            <a:ext cx="4575973" cy="830997"/>
-          </a:xfrm>
-          <a:prstGeom prst="rect">
-            <a:avLst/>
-          </a:prstGeom>
-        </p:spPr>
-        <p:txBody>
-          <a:bodyPr wrap="square">
-            <a:spAutoFit/>
-          </a:bodyPr>
-          <a:lstStyle/>
-          <a:p>
-            <a:pPr marL="180975" indent="-180975">
-              <a:buFont typeface="+mj-lt"/>
-              <a:buAutoNum type="arabicPeriod"/>
-            </a:pPr>
-            <a:r>
-              <a:rPr lang="en-US" sz="1600" dirty="0"/>
-              <a:t>Deck List View (Default View)</a:t>
-            </a:r>
-          </a:p>
-          <a:p>
-            <a:pPr marL="447675" lvl="1" indent="-180975">
-              <a:buFont typeface="+mj-lt"/>
-              <a:buAutoNum type="arabicPeriod"/>
-            </a:pPr>
-            <a:r>
-              <a:rPr lang="en-US" sz="1600" dirty="0"/>
-              <a:t>displays the title of each Deck</a:t>
-            </a:r>
-          </a:p>
-          <a:p>
-            <a:pPr marL="447675" lvl="1" indent="-180975">
-              <a:buFont typeface="+mj-lt"/>
-              <a:buAutoNum type="arabicPeriod"/>
-            </a:pPr>
-            <a:r>
-              <a:rPr lang="en-US" sz="1600" dirty="0"/>
-              <a:t>displays the number of cards in each deck</a:t>
-            </a:r>
-          </a:p>
-        </p:txBody>
-      </p:sp>
-    </p:spTree>
-    <p:extLst>
-      <p:ext uri="{BB962C8B-B14F-4D97-AF65-F5344CB8AC3E}">
-        <p14:creationId xmlns:p14="http://schemas.microsoft.com/office/powerpoint/2010/main" val="1704947174"/>
       </p:ext>
     </p:extLst>
   </p:cSld>

</xml_diff>

<commit_message>
MOD | Add score
</commit_message>
<xml_diff>
--- a/design_architecture.pptx
+++ b/design_architecture.pptx
@@ -17374,7 +17374,7 @@
               <a:defRPr sz="1400"/>
             </a:pPr>
             <a:r>
-              <a:rPr lang="en-US" sz="1400" b="0" i="0" u="none" strike="noStrike" kern="1200" cap="none">
+              <a:rPr lang="en-US" sz="1400" b="0" i="0" u="none" strike="noStrike" kern="1200" cap="none" dirty="0">
                 <a:ln>
                   <a:noFill/>
                 </a:ln>
@@ -17602,6 +17602,70 @@
           </a:p>
         </p:txBody>
       </p:sp>
+      <p:sp>
+        <p:nvSpPr>
+          <p:cNvPr id="24" name="Rechteck 23">
+            <a:extLst>
+              <a:ext uri="{FF2B5EF4-FFF2-40B4-BE49-F238E27FC236}">
+                <a16:creationId xmlns:a16="http://schemas.microsoft.com/office/drawing/2014/main" id="{F3A047F4-D670-4821-8097-0E41F3BD5CD9}"/>
+              </a:ext>
+            </a:extLst>
+          </p:cNvPr>
+          <p:cNvSpPr/>
+          <p:nvPr/>
+        </p:nvSpPr>
+        <p:spPr>
+          <a:xfrm>
+            <a:off x="5443064" y="4818074"/>
+            <a:ext cx="968535" cy="369332"/>
+          </a:xfrm>
+          <a:prstGeom prst="rect">
+            <a:avLst/>
+          </a:prstGeom>
+        </p:spPr>
+        <p:txBody>
+          <a:bodyPr wrap="none">
+            <a:spAutoFit/>
+          </a:bodyPr>
+          <a:lstStyle/>
+          <a:p>
+            <a:r>
+              <a:rPr lang="en-AU" dirty="0"/>
+              <a:t>#bcc560</a:t>
+            </a:r>
+          </a:p>
+        </p:txBody>
+      </p:sp>
+      <p:pic>
+        <p:nvPicPr>
+          <p:cNvPr id="25" name="Grafik 24">
+            <a:extLst>
+              <a:ext uri="{FF2B5EF4-FFF2-40B4-BE49-F238E27FC236}">
+                <a16:creationId xmlns:a16="http://schemas.microsoft.com/office/drawing/2014/main" id="{1F7CE3C9-DF89-4611-B805-429BB052CF18}"/>
+              </a:ext>
+            </a:extLst>
+          </p:cNvPr>
+          <p:cNvPicPr>
+            <a:picLocks noChangeAspect="1"/>
+          </p:cNvPicPr>
+          <p:nvPr/>
+        </p:nvPicPr>
+        <p:blipFill>
+          <a:blip r:embed="rId3"/>
+          <a:stretch>
+            <a:fillRect/>
+          </a:stretch>
+        </p:blipFill>
+        <p:spPr>
+          <a:xfrm>
+            <a:off x="5545857" y="4347180"/>
+            <a:ext cx="562202" cy="485971"/>
+          </a:xfrm>
+          <a:prstGeom prst="rect">
+            <a:avLst/>
+          </a:prstGeom>
+        </p:spPr>
+      </p:pic>
     </p:spTree>
   </p:cSld>
   <p:clrMapOvr>

</xml_diff>